<commit_message>
Documentation + Comments on PP
</commit_message>
<xml_diff>
--- a/doc/Präsentation/MEAN Notes.pptx
+++ b/doc/Präsentation/MEAN Notes.pptx
@@ -4,6 +4,9 @@
   <p:sldMasterIdLst>
     <p:sldMasterId id="2147483970" r:id="rId1"/>
   </p:sldMasterIdLst>
+  <p:notesMasterIdLst>
+    <p:notesMasterId r:id="rId14"/>
+  </p:notesMasterIdLst>
   <p:sldIdLst>
     <p:sldId id="256" r:id="rId2"/>
     <p:sldId id="257" r:id="rId3"/>
@@ -14,8 +17,9 @@
     <p:sldId id="263" r:id="rId8"/>
     <p:sldId id="264" r:id="rId9"/>
     <p:sldId id="265" r:id="rId10"/>
-    <p:sldId id="266" r:id="rId11"/>
-    <p:sldId id="267" r:id="rId12"/>
+    <p:sldId id="268" r:id="rId11"/>
+    <p:sldId id="266" r:id="rId12"/>
+    <p:sldId id="267" r:id="rId13"/>
   </p:sldIdLst>
   <p:sldSz cx="12192000" cy="6858000"/>
   <p:notesSz cx="6858000" cy="9144000"/>
@@ -1408,11 +1412,15 @@
         <a:p>
           <a:r>
             <a:rPr lang="de-DE" sz="1900" dirty="0" err="1" smtClean="0"/>
-            <a:t>caterories</a:t>
+            <a:t>categories</a:t>
           </a:r>
           <a:r>
             <a:rPr lang="de-DE" sz="1900" dirty="0" smtClean="0"/>
-            <a:t> : [ ]</a:t>
+            <a:t> </a:t>
+          </a:r>
+          <a:r>
+            <a:rPr lang="de-DE" sz="1900" dirty="0" smtClean="0"/>
+            <a:t>: [ ]</a:t>
           </a:r>
           <a:endParaRPr lang="de-DE" sz="1900" dirty="0"/>
         </a:p>
@@ -1670,11 +1678,15 @@
         <a:p>
           <a:r>
             <a:rPr lang="de-DE" sz="1900" dirty="0" err="1" smtClean="0"/>
-            <a:t>caterories</a:t>
+            <a:t>categories</a:t>
           </a:r>
           <a:r>
             <a:rPr lang="de-DE" sz="1900" dirty="0" smtClean="0"/>
-            <a:t> : [ ]</a:t>
+            <a:t> </a:t>
+          </a:r>
+          <a:r>
+            <a:rPr lang="de-DE" sz="1900" dirty="0" smtClean="0"/>
+            <a:t>: [ ]</a:t>
           </a:r>
           <a:endParaRPr lang="de-DE" sz="1900" dirty="0"/>
         </a:p>
@@ -1838,6 +1850,13 @@
         </dgm:presLayoutVars>
       </dgm:prSet>
       <dgm:spPr/>
+      <dgm:t>
+        <a:bodyPr/>
+        <a:lstStyle/>
+        <a:p>
+          <a:endParaRPr lang="de-DE"/>
+        </a:p>
+      </dgm:t>
     </dgm:pt>
     <dgm:pt modelId="{DAFE2E1E-AE37-4C40-BA41-14590B8EE766}" type="pres">
       <dgm:prSet presAssocID="{5AA5FD75-5C90-4429-96FE-EA28159F142D}" presName="composite" presStyleCnt="0"/>
@@ -1964,8 +1983,8 @@
     <dgm:cxn modelId="{5BF3E34A-AC80-4682-8403-46A529575F7A}" type="presOf" srcId="{B2C592FA-1A6D-4E4E-A9F6-662A3908022D}" destId="{FFF38D35-7D94-4F39-9648-B2AB98F610BE}" srcOrd="0" destOrd="1" presId="urn:microsoft.com/office/officeart/2005/8/layout/hList1"/>
     <dgm:cxn modelId="{07F64291-A92B-4C60-926C-39BD6C3E7452}" srcId="{0A180470-D629-4A2F-A707-AC08E7EE7821}" destId="{1C7766AA-29C1-428A-BEF5-8CE292095754}" srcOrd="0" destOrd="0" parTransId="{FDFC3CD1-1FDC-41D2-B700-F2FC3E7FD9D0}" sibTransId="{907716D9-1125-4DC6-ADC0-01ADE899796A}"/>
     <dgm:cxn modelId="{BBA16565-49A4-4D06-92F3-CB59CE2ED0E5}" srcId="{5AA5FD75-5C90-4429-96FE-EA28159F142D}" destId="{F7601433-8EAB-43F8-8E5A-0CC8D7C03C9C}" srcOrd="3" destOrd="0" parTransId="{ECFB8B93-93A8-447C-A4C8-E0A67BBDFD13}" sibTransId="{B707568B-EED8-439D-8D4E-8733E2FEE688}"/>
+    <dgm:cxn modelId="{399C1B78-D0B5-43B3-B982-9FAB982DECAD}" srcId="{45D67FC7-9484-4BD2-96D9-5DC0D4DC919F}" destId="{B2C592FA-1A6D-4E4E-A9F6-662A3908022D}" srcOrd="1" destOrd="0" parTransId="{A18EE425-83C3-47C1-A9B4-FF6282063EFA}" sibTransId="{774724CD-A5F5-46F6-9661-F1139E47DC06}"/>
     <dgm:cxn modelId="{2212B5D8-DD80-47D7-89D8-2E3EAE0B61A0}" type="presOf" srcId="{05C7682C-30BD-4F6B-8D3E-F795974ED1B1}" destId="{E2FEDD15-6C55-4357-B7C9-D7888B6098CA}" srcOrd="0" destOrd="2" presId="urn:microsoft.com/office/officeart/2005/8/layout/hList1"/>
-    <dgm:cxn modelId="{399C1B78-D0B5-43B3-B982-9FAB982DECAD}" srcId="{45D67FC7-9484-4BD2-96D9-5DC0D4DC919F}" destId="{B2C592FA-1A6D-4E4E-A9F6-662A3908022D}" srcOrd="1" destOrd="0" parTransId="{A18EE425-83C3-47C1-A9B4-FF6282063EFA}" sibTransId="{774724CD-A5F5-46F6-9661-F1139E47DC06}"/>
     <dgm:cxn modelId="{463A04E0-0E16-4E7B-A20B-0825754EC6D7}" srcId="{45D67FC7-9484-4BD2-96D9-5DC0D4DC919F}" destId="{7D1F6B58-A72A-43D8-9441-9AFAF2A7FBC3}" srcOrd="5" destOrd="0" parTransId="{9E2D9AB1-C208-4637-A70A-D0AAD3B62335}" sibTransId="{CD601143-3120-4D95-BAA6-56A57A6BE8CB}"/>
     <dgm:cxn modelId="{722C260F-26E4-489D-BBCD-4CE420722106}" type="presOf" srcId="{402C3787-C119-4975-B2C3-FDC33B51A950}" destId="{E2FEDD15-6C55-4357-B7C9-D7888B6098CA}" srcOrd="0" destOrd="3" presId="urn:microsoft.com/office/officeart/2005/8/layout/hList1"/>
     <dgm:cxn modelId="{AE5EDADB-7948-46B8-850C-8862EB92663F}" srcId="{5AA5FD75-5C90-4429-96FE-EA28159F142D}" destId="{C3379581-7EC1-4BC6-8381-BAFCA1887E1F}" srcOrd="0" destOrd="0" parTransId="{C895AC90-D1DA-45D1-8BDD-2F71CD8128F0}" sibTransId="{B98963D3-C707-40A2-BFF1-69D4253DF9B0}"/>
@@ -1976,8 +1995,8 @@
     <dgm:cxn modelId="{0577D253-1036-47A8-B810-A735390FEBE6}" srcId="{A6B4E31E-BF13-43E9-A8DF-1D0CED72AE2B}" destId="{0A180470-D629-4A2F-A707-AC08E7EE7821}" srcOrd="1" destOrd="0" parTransId="{E8C6D964-0C3D-4EE5-93FE-EB8BA448D4DC}" sibTransId="{AEB55458-9C91-4297-89D4-34C873B7BFA6}"/>
     <dgm:cxn modelId="{D39F9551-7A9C-4BBA-B9B5-58E7BD540672}" srcId="{45D67FC7-9484-4BD2-96D9-5DC0D4DC919F}" destId="{D43A8187-F70D-4382-97AF-2C1BAAAD39F2}" srcOrd="3" destOrd="0" parTransId="{B3AF1AFC-2EFD-470D-8334-5BB3800BEAE5}" sibTransId="{BA38E681-6A32-4A4F-9143-88D4B0706EAC}"/>
     <dgm:cxn modelId="{327244BB-FF70-480C-8140-C95AD341320E}" srcId="{0A180470-D629-4A2F-A707-AC08E7EE7821}" destId="{402C3787-C119-4975-B2C3-FDC33B51A950}" srcOrd="3" destOrd="0" parTransId="{6C90D17A-25EE-471C-B063-6FEBC0DB6C7E}" sibTransId="{8534571D-9358-468F-8107-890062D306FB}"/>
+    <dgm:cxn modelId="{5607A11E-0468-4EA4-B201-3E27E70E1982}" type="presOf" srcId="{C3379581-7EC1-4BC6-8381-BAFCA1887E1F}" destId="{F5E4AB33-7C02-4210-A409-8AD4743E5C7F}" srcOrd="0" destOrd="0" presId="urn:microsoft.com/office/officeart/2005/8/layout/hList1"/>
     <dgm:cxn modelId="{A5B0E6D2-FDF1-4B66-A937-34E78F3A23F4}" srcId="{45D67FC7-9484-4BD2-96D9-5DC0D4DC919F}" destId="{A2BFB9B8-DC9E-4DB2-A6FC-2E8A7188049F}" srcOrd="4" destOrd="0" parTransId="{01F339B7-F73F-4572-AB8B-4F804846FC8A}" sibTransId="{6EE000F8-9836-427C-94FC-658B005FF7FA}"/>
-    <dgm:cxn modelId="{5607A11E-0468-4EA4-B201-3E27E70E1982}" type="presOf" srcId="{C3379581-7EC1-4BC6-8381-BAFCA1887E1F}" destId="{F5E4AB33-7C02-4210-A409-8AD4743E5C7F}" srcOrd="0" destOrd="0" presId="urn:microsoft.com/office/officeart/2005/8/layout/hList1"/>
     <dgm:cxn modelId="{E4929EAA-58F6-4332-AB15-6A9CB3579A7D}" srcId="{B76DA727-A040-4538-8008-3CDD5AF6C4CD}" destId="{74DCB112-97B7-43B7-B971-E99A399335BB}" srcOrd="1" destOrd="0" parTransId="{C132FE06-D957-410B-891C-7E9D715895E2}" sibTransId="{3DB06AFA-5E0D-464A-B73D-EF233128865A}"/>
     <dgm:cxn modelId="{F77FF049-E61B-42EA-8C8E-9F2E95115064}" type="presOf" srcId="{7D1F6B58-A72A-43D8-9441-9AFAF2A7FBC3}" destId="{FFF38D35-7D94-4F39-9648-B2AB98F610BE}" srcOrd="0" destOrd="5" presId="urn:microsoft.com/office/officeart/2005/8/layout/hList1"/>
     <dgm:cxn modelId="{5F309194-1D4F-4428-BD83-CF4A32D3DD0B}" type="presOf" srcId="{45D67FC7-9484-4BD2-96D9-5DC0D4DC919F}" destId="{408356D3-9949-4E29-8747-B7EE15A2C512}" srcOrd="0" destOrd="0" presId="urn:microsoft.com/office/officeart/2005/8/layout/hList1"/>
@@ -1993,8 +2012,8 @@
     <dgm:cxn modelId="{A64AE706-5337-4E33-921C-F3A7DC78317B}" type="presOf" srcId="{4D15D454-5719-43AD-ABCB-88009645E105}" destId="{E2FEDD15-6C55-4357-B7C9-D7888B6098CA}" srcOrd="0" destOrd="4" presId="urn:microsoft.com/office/officeart/2005/8/layout/hList1"/>
     <dgm:cxn modelId="{BF47847D-E076-4325-B057-D7CDBECFFEAC}" type="presOf" srcId="{5AA5FD75-5C90-4429-96FE-EA28159F142D}" destId="{19E0F596-C569-49EE-A858-0212E44E8361}" srcOrd="0" destOrd="0" presId="urn:microsoft.com/office/officeart/2005/8/layout/hList1"/>
     <dgm:cxn modelId="{DD694FD2-C66C-4BBD-B4FC-2B82FFE3651A}" type="presOf" srcId="{0A180470-D629-4A2F-A707-AC08E7EE7821}" destId="{CEB00F75-F7C3-4B6C-8DA8-4BE0DDA62DD1}" srcOrd="0" destOrd="0" presId="urn:microsoft.com/office/officeart/2005/8/layout/hList1"/>
+    <dgm:cxn modelId="{9F665977-5822-484D-8DE1-963728038FAD}" type="presOf" srcId="{A1DBACA7-05CB-48CB-9B53-54FBCB2A5237}" destId="{E2FEDD15-6C55-4357-B7C9-D7888B6098CA}" srcOrd="0" destOrd="1" presId="urn:microsoft.com/office/officeart/2005/8/layout/hList1"/>
     <dgm:cxn modelId="{BA27A05B-FD7F-4922-99CF-4CC7281017F3}" type="presOf" srcId="{1C7766AA-29C1-428A-BEF5-8CE292095754}" destId="{E2FEDD15-6C55-4357-B7C9-D7888B6098CA}" srcOrd="0" destOrd="0" presId="urn:microsoft.com/office/officeart/2005/8/layout/hList1"/>
-    <dgm:cxn modelId="{9F665977-5822-484D-8DE1-963728038FAD}" type="presOf" srcId="{A1DBACA7-05CB-48CB-9B53-54FBCB2A5237}" destId="{E2FEDD15-6C55-4357-B7C9-D7888B6098CA}" srcOrd="0" destOrd="1" presId="urn:microsoft.com/office/officeart/2005/8/layout/hList1"/>
     <dgm:cxn modelId="{24F47EC5-40EB-4A7E-BF36-CF1B2EC345A0}" type="presOf" srcId="{844E8EA2-E497-4CA3-B913-F411BEDF9016}" destId="{FFF38D35-7D94-4F39-9648-B2AB98F610BE}" srcOrd="0" destOrd="7" presId="urn:microsoft.com/office/officeart/2005/8/layout/hList1"/>
     <dgm:cxn modelId="{23F1E98B-ABBC-4F70-A0CB-04E81DF0C8D2}" type="presOf" srcId="{26495795-AD98-421D-933B-5002B29E1146}" destId="{E2FEDD15-6C55-4357-B7C9-D7888B6098CA}" srcOrd="0" destOrd="5" presId="urn:microsoft.com/office/officeart/2005/8/layout/hList1"/>
     <dgm:cxn modelId="{AE71030A-1423-47FE-B3FA-C158896A68C8}" srcId="{5AA5FD75-5C90-4429-96FE-EA28159F142D}" destId="{28DA6E57-6E4A-46E2-8F73-AB7912C84143}" srcOrd="2" destOrd="0" parTransId="{375877AB-1F99-4D60-B5EC-F6E910E9DEAD}" sibTransId="{95EBC766-07AF-44C1-BC8F-52303DEBD8A7}"/>
@@ -2018,7 +2037,7 @@
   <dgm:whole/>
   <dgm:extLst>
     <a:ext uri="http://schemas.microsoft.com/office/drawing/2008/diagram">
-      <dsp:dataModelExt xmlns:dsp="http://schemas.microsoft.com/office/drawing/2008/diagram" relId="rId6" minVer="http://schemas.openxmlformats.org/drawingml/2006/diagram"/>
+      <dsp:dataModelExt xmlns:dsp="http://schemas.microsoft.com/office/drawing/2008/diagram" relId="rId7" minVer="http://schemas.openxmlformats.org/drawingml/2006/diagram"/>
     </a:ext>
   </dgm:extLst>
 </dgm:dataModel>
@@ -2552,11 +2571,15 @@
           </a:pPr>
           <a:r>
             <a:rPr lang="de-DE" sz="1900" kern="1200" dirty="0" err="1" smtClean="0"/>
-            <a:t>caterories</a:t>
+            <a:t>categories</a:t>
           </a:r>
           <a:r>
             <a:rPr lang="de-DE" sz="1900" kern="1200" dirty="0" smtClean="0"/>
-            <a:t> : [ ]</a:t>
+            <a:t> </a:t>
+          </a:r>
+          <a:r>
+            <a:rPr lang="de-DE" sz="1900" kern="1200" dirty="0" smtClean="0"/>
+            <a:t>: [ ]</a:t>
           </a:r>
           <a:endParaRPr lang="de-DE" sz="1900" kern="1200" dirty="0"/>
         </a:p>
@@ -2952,11 +2975,15 @@
           </a:pPr>
           <a:r>
             <a:rPr lang="de-DE" sz="1900" kern="1200" dirty="0" err="1" smtClean="0"/>
-            <a:t>caterories</a:t>
+            <a:t>categories</a:t>
           </a:r>
           <a:r>
             <a:rPr lang="de-DE" sz="1900" kern="1200" dirty="0" smtClean="0"/>
-            <a:t> : [ ]</a:t>
+            <a:t> </a:t>
+          </a:r>
+          <a:r>
+            <a:rPr lang="de-DE" sz="1900" kern="1200" dirty="0" smtClean="0"/>
+            <a:t>: [ ]</a:t>
           </a:r>
           <a:endParaRPr lang="de-DE" sz="1900" kern="1200" dirty="0"/>
         </a:p>
@@ -4263,6 +4290,1128 @@
 </dgm:styleDef>
 </file>
 
+<file path=ppt/notesMasters/notesMaster1.xml><?xml version="1.0" encoding="utf-8"?>
+<p:notesMaster xmlns:a="http://schemas.openxmlformats.org/drawingml/2006/main" xmlns:r="http://schemas.openxmlformats.org/officeDocument/2006/relationships" xmlns:p="http://schemas.openxmlformats.org/presentationml/2006/main">
+  <p:cSld>
+    <p:bg>
+      <p:bgRef idx="1001">
+        <a:schemeClr val="bg1"/>
+      </p:bgRef>
+    </p:bg>
+    <p:spTree>
+      <p:nvGrpSpPr>
+        <p:cNvPr id="1" name=""/>
+        <p:cNvGrpSpPr/>
+        <p:nvPr/>
+      </p:nvGrpSpPr>
+      <p:grpSpPr>
+        <a:xfrm>
+          <a:off x="0" y="0"/>
+          <a:ext cx="0" cy="0"/>
+          <a:chOff x="0" y="0"/>
+          <a:chExt cx="0" cy="0"/>
+        </a:xfrm>
+      </p:grpSpPr>
+      <p:sp>
+        <p:nvSpPr>
+          <p:cNvPr id="2" name="Kopfzeilenplatzhalter 1"/>
+          <p:cNvSpPr>
+            <a:spLocks noGrp="1"/>
+          </p:cNvSpPr>
+          <p:nvPr>
+            <p:ph type="hdr" sz="quarter"/>
+          </p:nvPr>
+        </p:nvSpPr>
+        <p:spPr>
+          <a:xfrm>
+            <a:off x="0" y="0"/>
+            <a:ext cx="2971800" cy="458788"/>
+          </a:xfrm>
+          <a:prstGeom prst="rect">
+            <a:avLst/>
+          </a:prstGeom>
+        </p:spPr>
+        <p:txBody>
+          <a:bodyPr vert="horz" lIns="91440" tIns="45720" rIns="91440" bIns="45720" rtlCol="0"/>
+          <a:lstStyle>
+            <a:lvl1pPr algn="l">
+              <a:defRPr sz="1200"/>
+            </a:lvl1pPr>
+          </a:lstStyle>
+          <a:p>
+            <a:endParaRPr lang="de-DE"/>
+          </a:p>
+        </p:txBody>
+      </p:sp>
+      <p:sp>
+        <p:nvSpPr>
+          <p:cNvPr id="3" name="Datumsplatzhalter 2"/>
+          <p:cNvSpPr>
+            <a:spLocks noGrp="1"/>
+          </p:cNvSpPr>
+          <p:nvPr>
+            <p:ph type="dt" idx="1"/>
+          </p:nvPr>
+        </p:nvSpPr>
+        <p:spPr>
+          <a:xfrm>
+            <a:off x="3884613" y="0"/>
+            <a:ext cx="2971800" cy="458788"/>
+          </a:xfrm>
+          <a:prstGeom prst="rect">
+            <a:avLst/>
+          </a:prstGeom>
+        </p:spPr>
+        <p:txBody>
+          <a:bodyPr vert="horz" lIns="91440" tIns="45720" rIns="91440" bIns="45720" rtlCol="0"/>
+          <a:lstStyle>
+            <a:lvl1pPr algn="r">
+              <a:defRPr sz="1200"/>
+            </a:lvl1pPr>
+          </a:lstStyle>
+          <a:p>
+            <a:fld id="{9533D94C-F366-49B4-85A2-9678B09A1231}" type="datetimeFigureOut">
+              <a:rPr lang="de-DE" smtClean="0"/>
+              <a:t>10.02.2016</a:t>
+            </a:fld>
+            <a:endParaRPr lang="de-DE"/>
+          </a:p>
+        </p:txBody>
+      </p:sp>
+      <p:sp>
+        <p:nvSpPr>
+          <p:cNvPr id="4" name="Folienbildplatzhalter 3"/>
+          <p:cNvSpPr>
+            <a:spLocks noGrp="1" noRot="1" noChangeAspect="1"/>
+          </p:cNvSpPr>
+          <p:nvPr>
+            <p:ph type="sldImg" idx="2"/>
+          </p:nvPr>
+        </p:nvSpPr>
+        <p:spPr>
+          <a:xfrm>
+            <a:off x="685800" y="1143000"/>
+            <a:ext cx="5486400" cy="3086100"/>
+          </a:xfrm>
+          <a:prstGeom prst="rect">
+            <a:avLst/>
+          </a:prstGeom>
+          <a:noFill/>
+          <a:ln w="12700">
+            <a:solidFill>
+              <a:prstClr val="black"/>
+            </a:solidFill>
+          </a:ln>
+        </p:spPr>
+        <p:txBody>
+          <a:bodyPr vert="horz" lIns="91440" tIns="45720" rIns="91440" bIns="45720" rtlCol="0" anchor="ctr"/>
+          <a:lstStyle/>
+          <a:p>
+            <a:endParaRPr lang="de-DE"/>
+          </a:p>
+        </p:txBody>
+      </p:sp>
+      <p:sp>
+        <p:nvSpPr>
+          <p:cNvPr id="5" name="Notizenplatzhalter 4"/>
+          <p:cNvSpPr>
+            <a:spLocks noGrp="1"/>
+          </p:cNvSpPr>
+          <p:nvPr>
+            <p:ph type="body" sz="quarter" idx="3"/>
+          </p:nvPr>
+        </p:nvSpPr>
+        <p:spPr>
+          <a:xfrm>
+            <a:off x="685800" y="4400550"/>
+            <a:ext cx="5486400" cy="3600450"/>
+          </a:xfrm>
+          <a:prstGeom prst="rect">
+            <a:avLst/>
+          </a:prstGeom>
+        </p:spPr>
+        <p:txBody>
+          <a:bodyPr vert="horz" lIns="91440" tIns="45720" rIns="91440" bIns="45720" rtlCol="0"/>
+          <a:lstStyle/>
+          <a:p>
+            <a:pPr lvl="0"/>
+            <a:r>
+              <a:rPr lang="de-DE" smtClean="0"/>
+              <a:t>Textmasterformat bearbeiten</a:t>
+            </a:r>
+          </a:p>
+          <a:p>
+            <a:pPr lvl="1"/>
+            <a:r>
+              <a:rPr lang="de-DE" smtClean="0"/>
+              <a:t>Zweite Ebene</a:t>
+            </a:r>
+          </a:p>
+          <a:p>
+            <a:pPr lvl="2"/>
+            <a:r>
+              <a:rPr lang="de-DE" smtClean="0"/>
+              <a:t>Dritte Ebene</a:t>
+            </a:r>
+          </a:p>
+          <a:p>
+            <a:pPr lvl="3"/>
+            <a:r>
+              <a:rPr lang="de-DE" smtClean="0"/>
+              <a:t>Vierte Ebene</a:t>
+            </a:r>
+          </a:p>
+          <a:p>
+            <a:pPr lvl="4"/>
+            <a:r>
+              <a:rPr lang="de-DE" smtClean="0"/>
+              <a:t>Fünfte Ebene</a:t>
+            </a:r>
+            <a:endParaRPr lang="de-DE"/>
+          </a:p>
+        </p:txBody>
+      </p:sp>
+      <p:sp>
+        <p:nvSpPr>
+          <p:cNvPr id="6" name="Fußzeilenplatzhalter 5"/>
+          <p:cNvSpPr>
+            <a:spLocks noGrp="1"/>
+          </p:cNvSpPr>
+          <p:nvPr>
+            <p:ph type="ftr" sz="quarter" idx="4"/>
+          </p:nvPr>
+        </p:nvSpPr>
+        <p:spPr>
+          <a:xfrm>
+            <a:off x="0" y="8685213"/>
+            <a:ext cx="2971800" cy="458787"/>
+          </a:xfrm>
+          <a:prstGeom prst="rect">
+            <a:avLst/>
+          </a:prstGeom>
+        </p:spPr>
+        <p:txBody>
+          <a:bodyPr vert="horz" lIns="91440" tIns="45720" rIns="91440" bIns="45720" rtlCol="0" anchor="b"/>
+          <a:lstStyle>
+            <a:lvl1pPr algn="l">
+              <a:defRPr sz="1200"/>
+            </a:lvl1pPr>
+          </a:lstStyle>
+          <a:p>
+            <a:endParaRPr lang="de-DE"/>
+          </a:p>
+        </p:txBody>
+      </p:sp>
+      <p:sp>
+        <p:nvSpPr>
+          <p:cNvPr id="7" name="Foliennummernplatzhalter 6"/>
+          <p:cNvSpPr>
+            <a:spLocks noGrp="1"/>
+          </p:cNvSpPr>
+          <p:nvPr>
+            <p:ph type="sldNum" sz="quarter" idx="5"/>
+          </p:nvPr>
+        </p:nvSpPr>
+        <p:spPr>
+          <a:xfrm>
+            <a:off x="3884613" y="8685213"/>
+            <a:ext cx="2971800" cy="458787"/>
+          </a:xfrm>
+          <a:prstGeom prst="rect">
+            <a:avLst/>
+          </a:prstGeom>
+        </p:spPr>
+        <p:txBody>
+          <a:bodyPr vert="horz" lIns="91440" tIns="45720" rIns="91440" bIns="45720" rtlCol="0" anchor="b"/>
+          <a:lstStyle>
+            <a:lvl1pPr algn="r">
+              <a:defRPr sz="1200"/>
+            </a:lvl1pPr>
+          </a:lstStyle>
+          <a:p>
+            <a:fld id="{14BEC569-9E05-4323-A98C-4047FABAF080}" type="slidenum">
+              <a:rPr lang="de-DE" smtClean="0"/>
+              <a:t>‹Nr.›</a:t>
+            </a:fld>
+            <a:endParaRPr lang="de-DE"/>
+          </a:p>
+        </p:txBody>
+      </p:sp>
+    </p:spTree>
+    <p:extLst>
+      <p:ext uri="{BB962C8B-B14F-4D97-AF65-F5344CB8AC3E}">
+        <p14:creationId xmlns:p14="http://schemas.microsoft.com/office/powerpoint/2010/main" val="2164897224"/>
+      </p:ext>
+    </p:extLst>
+  </p:cSld>
+  <p:clrMap bg1="lt1" tx1="dk1" bg2="lt2" tx2="dk2" accent1="accent1" accent2="accent2" accent3="accent3" accent4="accent4" accent5="accent5" accent6="accent6" hlink="hlink" folHlink="folHlink"/>
+  <p:notesStyle>
+    <a:lvl1pPr marL="0" algn="l" defTabSz="914400" rtl="0" eaLnBrk="1" latinLnBrk="0" hangingPunct="1">
+      <a:defRPr sz="1200" kern="1200">
+        <a:solidFill>
+          <a:schemeClr val="tx1"/>
+        </a:solidFill>
+        <a:latin typeface="+mn-lt"/>
+        <a:ea typeface="+mn-ea"/>
+        <a:cs typeface="+mn-cs"/>
+      </a:defRPr>
+    </a:lvl1pPr>
+    <a:lvl2pPr marL="457200" algn="l" defTabSz="914400" rtl="0" eaLnBrk="1" latinLnBrk="0" hangingPunct="1">
+      <a:defRPr sz="1200" kern="1200">
+        <a:solidFill>
+          <a:schemeClr val="tx1"/>
+        </a:solidFill>
+        <a:latin typeface="+mn-lt"/>
+        <a:ea typeface="+mn-ea"/>
+        <a:cs typeface="+mn-cs"/>
+      </a:defRPr>
+    </a:lvl2pPr>
+    <a:lvl3pPr marL="914400" algn="l" defTabSz="914400" rtl="0" eaLnBrk="1" latinLnBrk="0" hangingPunct="1">
+      <a:defRPr sz="1200" kern="1200">
+        <a:solidFill>
+          <a:schemeClr val="tx1"/>
+        </a:solidFill>
+        <a:latin typeface="+mn-lt"/>
+        <a:ea typeface="+mn-ea"/>
+        <a:cs typeface="+mn-cs"/>
+      </a:defRPr>
+    </a:lvl3pPr>
+    <a:lvl4pPr marL="1371600" algn="l" defTabSz="914400" rtl="0" eaLnBrk="1" latinLnBrk="0" hangingPunct="1">
+      <a:defRPr sz="1200" kern="1200">
+        <a:solidFill>
+          <a:schemeClr val="tx1"/>
+        </a:solidFill>
+        <a:latin typeface="+mn-lt"/>
+        <a:ea typeface="+mn-ea"/>
+        <a:cs typeface="+mn-cs"/>
+      </a:defRPr>
+    </a:lvl4pPr>
+    <a:lvl5pPr marL="1828800" algn="l" defTabSz="914400" rtl="0" eaLnBrk="1" latinLnBrk="0" hangingPunct="1">
+      <a:defRPr sz="1200" kern="1200">
+        <a:solidFill>
+          <a:schemeClr val="tx1"/>
+        </a:solidFill>
+        <a:latin typeface="+mn-lt"/>
+        <a:ea typeface="+mn-ea"/>
+        <a:cs typeface="+mn-cs"/>
+      </a:defRPr>
+    </a:lvl5pPr>
+    <a:lvl6pPr marL="2286000" algn="l" defTabSz="914400" rtl="0" eaLnBrk="1" latinLnBrk="0" hangingPunct="1">
+      <a:defRPr sz="1200" kern="1200">
+        <a:solidFill>
+          <a:schemeClr val="tx1"/>
+        </a:solidFill>
+        <a:latin typeface="+mn-lt"/>
+        <a:ea typeface="+mn-ea"/>
+        <a:cs typeface="+mn-cs"/>
+      </a:defRPr>
+    </a:lvl6pPr>
+    <a:lvl7pPr marL="2743200" algn="l" defTabSz="914400" rtl="0" eaLnBrk="1" latinLnBrk="0" hangingPunct="1">
+      <a:defRPr sz="1200" kern="1200">
+        <a:solidFill>
+          <a:schemeClr val="tx1"/>
+        </a:solidFill>
+        <a:latin typeface="+mn-lt"/>
+        <a:ea typeface="+mn-ea"/>
+        <a:cs typeface="+mn-cs"/>
+      </a:defRPr>
+    </a:lvl7pPr>
+    <a:lvl8pPr marL="3200400" algn="l" defTabSz="914400" rtl="0" eaLnBrk="1" latinLnBrk="0" hangingPunct="1">
+      <a:defRPr sz="1200" kern="1200">
+        <a:solidFill>
+          <a:schemeClr val="tx1"/>
+        </a:solidFill>
+        <a:latin typeface="+mn-lt"/>
+        <a:ea typeface="+mn-ea"/>
+        <a:cs typeface="+mn-cs"/>
+      </a:defRPr>
+    </a:lvl8pPr>
+    <a:lvl9pPr marL="3657600" algn="l" defTabSz="914400" rtl="0" eaLnBrk="1" latinLnBrk="0" hangingPunct="1">
+      <a:defRPr sz="1200" kern="1200">
+        <a:solidFill>
+          <a:schemeClr val="tx1"/>
+        </a:solidFill>
+        <a:latin typeface="+mn-lt"/>
+        <a:ea typeface="+mn-ea"/>
+        <a:cs typeface="+mn-cs"/>
+      </a:defRPr>
+    </a:lvl9pPr>
+  </p:notesStyle>
+</p:notesMaster>
+</file>
+
+<file path=ppt/notesSlides/notesSlide1.xml><?xml version="1.0" encoding="utf-8"?>
+<p:notes xmlns:a="http://schemas.openxmlformats.org/drawingml/2006/main" xmlns:r="http://schemas.openxmlformats.org/officeDocument/2006/relationships" xmlns:p="http://schemas.openxmlformats.org/presentationml/2006/main">
+  <p:cSld>
+    <p:spTree>
+      <p:nvGrpSpPr>
+        <p:cNvPr id="1" name=""/>
+        <p:cNvGrpSpPr/>
+        <p:nvPr/>
+      </p:nvGrpSpPr>
+      <p:grpSpPr>
+        <a:xfrm>
+          <a:off x="0" y="0"/>
+          <a:ext cx="0" cy="0"/>
+          <a:chOff x="0" y="0"/>
+          <a:chExt cx="0" cy="0"/>
+        </a:xfrm>
+      </p:grpSpPr>
+      <p:sp>
+        <p:nvSpPr>
+          <p:cNvPr id="2" name="Folienbildplatzhalter 1"/>
+          <p:cNvSpPr>
+            <a:spLocks noGrp="1" noRot="1" noChangeAspect="1"/>
+          </p:cNvSpPr>
+          <p:nvPr>
+            <p:ph type="sldImg"/>
+          </p:nvPr>
+        </p:nvSpPr>
+        <p:spPr/>
+      </p:sp>
+      <p:sp>
+        <p:nvSpPr>
+          <p:cNvPr id="3" name="Notizenplatzhalter 2"/>
+          <p:cNvSpPr>
+            <a:spLocks noGrp="1"/>
+          </p:cNvSpPr>
+          <p:nvPr>
+            <p:ph type="body" idx="1"/>
+          </p:nvPr>
+        </p:nvSpPr>
+        <p:spPr/>
+        <p:txBody>
+          <a:bodyPr/>
+          <a:lstStyle/>
+          <a:p>
+            <a:r>
+              <a:rPr lang="de-DE" dirty="0" smtClean="0"/>
+              <a:t>Haben uns folgendes Inhaltsverzeichnis</a:t>
+            </a:r>
+            <a:r>
+              <a:rPr lang="de-DE" baseline="0" dirty="0" smtClean="0"/>
+              <a:t> überlegt …</a:t>
+            </a:r>
+            <a:endParaRPr lang="de-DE" dirty="0"/>
+          </a:p>
+        </p:txBody>
+      </p:sp>
+      <p:sp>
+        <p:nvSpPr>
+          <p:cNvPr id="4" name="Foliennummernplatzhalter 3"/>
+          <p:cNvSpPr>
+            <a:spLocks noGrp="1"/>
+          </p:cNvSpPr>
+          <p:nvPr>
+            <p:ph type="sldNum" sz="quarter" idx="10"/>
+          </p:nvPr>
+        </p:nvSpPr>
+        <p:spPr/>
+        <p:txBody>
+          <a:bodyPr/>
+          <a:lstStyle/>
+          <a:p>
+            <a:fld id="{14BEC569-9E05-4323-A98C-4047FABAF080}" type="slidenum">
+              <a:rPr lang="de-DE" smtClean="0"/>
+              <a:t>2</a:t>
+            </a:fld>
+            <a:endParaRPr lang="de-DE"/>
+          </a:p>
+        </p:txBody>
+      </p:sp>
+    </p:spTree>
+    <p:extLst>
+      <p:ext uri="{BB962C8B-B14F-4D97-AF65-F5344CB8AC3E}">
+        <p14:creationId xmlns:p14="http://schemas.microsoft.com/office/powerpoint/2010/main" val="794646333"/>
+      </p:ext>
+    </p:extLst>
+  </p:cSld>
+  <p:clrMapOvr>
+    <a:masterClrMapping/>
+  </p:clrMapOvr>
+</p:notes>
+</file>
+
+<file path=ppt/notesSlides/notesSlide2.xml><?xml version="1.0" encoding="utf-8"?>
+<p:notes xmlns:a="http://schemas.openxmlformats.org/drawingml/2006/main" xmlns:r="http://schemas.openxmlformats.org/officeDocument/2006/relationships" xmlns:p="http://schemas.openxmlformats.org/presentationml/2006/main">
+  <p:cSld>
+    <p:spTree>
+      <p:nvGrpSpPr>
+        <p:cNvPr id="1" name=""/>
+        <p:cNvGrpSpPr/>
+        <p:nvPr/>
+      </p:nvGrpSpPr>
+      <p:grpSpPr>
+        <a:xfrm>
+          <a:off x="0" y="0"/>
+          <a:ext cx="0" cy="0"/>
+          <a:chOff x="0" y="0"/>
+          <a:chExt cx="0" cy="0"/>
+        </a:xfrm>
+      </p:grpSpPr>
+      <p:sp>
+        <p:nvSpPr>
+          <p:cNvPr id="2" name="Folienbildplatzhalter 1"/>
+          <p:cNvSpPr>
+            <a:spLocks noGrp="1" noRot="1" noChangeAspect="1"/>
+          </p:cNvSpPr>
+          <p:nvPr>
+            <p:ph type="sldImg"/>
+          </p:nvPr>
+        </p:nvSpPr>
+        <p:spPr/>
+      </p:sp>
+      <p:sp>
+        <p:nvSpPr>
+          <p:cNvPr id="3" name="Notizenplatzhalter 2"/>
+          <p:cNvSpPr>
+            <a:spLocks noGrp="1"/>
+          </p:cNvSpPr>
+          <p:nvPr>
+            <p:ph type="body" idx="1"/>
+          </p:nvPr>
+        </p:nvSpPr>
+        <p:spPr/>
+        <p:txBody>
+          <a:bodyPr/>
+          <a:lstStyle/>
+          <a:p>
+            <a:r>
+              <a:rPr lang="de-DE" dirty="0" err="1" smtClean="0"/>
+              <a:t>Mockups</a:t>
+            </a:r>
+            <a:r>
+              <a:rPr lang="de-DE" dirty="0" smtClean="0"/>
+              <a:t> mit Proto.io erstellt</a:t>
+            </a:r>
+          </a:p>
+          <a:p>
+            <a:endParaRPr lang="de-DE" dirty="0" smtClean="0"/>
+          </a:p>
+          <a:p>
+            <a:r>
+              <a:rPr lang="de-DE" dirty="0" smtClean="0"/>
+              <a:t>Vorteile: </a:t>
+            </a:r>
+          </a:p>
+          <a:p>
+            <a:pPr marL="171450" indent="-171450">
+              <a:buFont typeface="Arial" panose="020B0604020202020204" pitchFamily="34" charset="0"/>
+              <a:buChar char="•"/>
+            </a:pPr>
+            <a:r>
+              <a:rPr lang="de-DE" dirty="0" err="1" smtClean="0"/>
+              <a:t>Mockup</a:t>
+            </a:r>
+            <a:r>
+              <a:rPr lang="de-DE" dirty="0" smtClean="0"/>
+              <a:t> im Material-Design</a:t>
+            </a:r>
+          </a:p>
+          <a:p>
+            <a:pPr marL="171450" indent="-171450">
+              <a:buFont typeface="Arial" panose="020B0604020202020204" pitchFamily="34" charset="0"/>
+              <a:buChar char="•"/>
+            </a:pPr>
+            <a:r>
+              <a:rPr lang="de-DE" dirty="0" smtClean="0"/>
+              <a:t>Interaktiv</a:t>
+            </a:r>
+          </a:p>
+          <a:p>
+            <a:pPr marL="171450" indent="-171450">
+              <a:buFont typeface="Arial" panose="020B0604020202020204" pitchFamily="34" charset="0"/>
+              <a:buChar char="•"/>
+            </a:pPr>
+            <a:r>
+              <a:rPr lang="de-DE" dirty="0" smtClean="0"/>
+              <a:t>Schön</a:t>
+            </a:r>
+          </a:p>
+          <a:p>
+            <a:endParaRPr lang="de-DE" dirty="0" smtClean="0"/>
+          </a:p>
+          <a:p>
+            <a:endParaRPr lang="de-DE" dirty="0"/>
+          </a:p>
+        </p:txBody>
+      </p:sp>
+      <p:sp>
+        <p:nvSpPr>
+          <p:cNvPr id="4" name="Foliennummernplatzhalter 3"/>
+          <p:cNvSpPr>
+            <a:spLocks noGrp="1"/>
+          </p:cNvSpPr>
+          <p:nvPr>
+            <p:ph type="sldNum" sz="quarter" idx="10"/>
+          </p:nvPr>
+        </p:nvSpPr>
+        <p:spPr/>
+        <p:txBody>
+          <a:bodyPr/>
+          <a:lstStyle/>
+          <a:p>
+            <a:fld id="{14BEC569-9E05-4323-A98C-4047FABAF080}" type="slidenum">
+              <a:rPr lang="de-DE" smtClean="0"/>
+              <a:t>5</a:t>
+            </a:fld>
+            <a:endParaRPr lang="de-DE"/>
+          </a:p>
+        </p:txBody>
+      </p:sp>
+    </p:spTree>
+    <p:extLst>
+      <p:ext uri="{BB962C8B-B14F-4D97-AF65-F5344CB8AC3E}">
+        <p14:creationId xmlns:p14="http://schemas.microsoft.com/office/powerpoint/2010/main" val="1761719000"/>
+      </p:ext>
+    </p:extLst>
+  </p:cSld>
+  <p:clrMapOvr>
+    <a:masterClrMapping/>
+  </p:clrMapOvr>
+</p:notes>
+</file>
+
+<file path=ppt/notesSlides/notesSlide3.xml><?xml version="1.0" encoding="utf-8"?>
+<p:notes xmlns:a="http://schemas.openxmlformats.org/drawingml/2006/main" xmlns:r="http://schemas.openxmlformats.org/officeDocument/2006/relationships" xmlns:p="http://schemas.openxmlformats.org/presentationml/2006/main">
+  <p:cSld>
+    <p:spTree>
+      <p:nvGrpSpPr>
+        <p:cNvPr id="1" name=""/>
+        <p:cNvGrpSpPr/>
+        <p:nvPr/>
+      </p:nvGrpSpPr>
+      <p:grpSpPr>
+        <a:xfrm>
+          <a:off x="0" y="0"/>
+          <a:ext cx="0" cy="0"/>
+          <a:chOff x="0" y="0"/>
+          <a:chExt cx="0" cy="0"/>
+        </a:xfrm>
+      </p:grpSpPr>
+      <p:sp>
+        <p:nvSpPr>
+          <p:cNvPr id="2" name="Folienbildplatzhalter 1"/>
+          <p:cNvSpPr>
+            <a:spLocks noGrp="1" noRot="1" noChangeAspect="1"/>
+          </p:cNvSpPr>
+          <p:nvPr>
+            <p:ph type="sldImg"/>
+          </p:nvPr>
+        </p:nvSpPr>
+        <p:spPr/>
+      </p:sp>
+      <p:sp>
+        <p:nvSpPr>
+          <p:cNvPr id="3" name="Notizenplatzhalter 2"/>
+          <p:cNvSpPr>
+            <a:spLocks noGrp="1"/>
+          </p:cNvSpPr>
+          <p:nvPr>
+            <p:ph type="body" idx="1"/>
+          </p:nvPr>
+        </p:nvSpPr>
+        <p:spPr/>
+        <p:txBody>
+          <a:bodyPr/>
+          <a:lstStyle/>
+          <a:p>
+            <a:r>
+              <a:rPr lang="de-DE" dirty="0" smtClean="0"/>
+              <a:t>Hier sieht man Interaktivität</a:t>
+            </a:r>
+          </a:p>
+          <a:p>
+            <a:endParaRPr lang="de-DE" dirty="0"/>
+          </a:p>
+        </p:txBody>
+      </p:sp>
+      <p:sp>
+        <p:nvSpPr>
+          <p:cNvPr id="4" name="Foliennummernplatzhalter 3"/>
+          <p:cNvSpPr>
+            <a:spLocks noGrp="1"/>
+          </p:cNvSpPr>
+          <p:nvPr>
+            <p:ph type="sldNum" sz="quarter" idx="10"/>
+          </p:nvPr>
+        </p:nvSpPr>
+        <p:spPr/>
+        <p:txBody>
+          <a:bodyPr/>
+          <a:lstStyle/>
+          <a:p>
+            <a:fld id="{14BEC569-9E05-4323-A98C-4047FABAF080}" type="slidenum">
+              <a:rPr lang="de-DE" smtClean="0"/>
+              <a:t>6</a:t>
+            </a:fld>
+            <a:endParaRPr lang="de-DE"/>
+          </a:p>
+        </p:txBody>
+      </p:sp>
+    </p:spTree>
+    <p:extLst>
+      <p:ext uri="{BB962C8B-B14F-4D97-AF65-F5344CB8AC3E}">
+        <p14:creationId xmlns:p14="http://schemas.microsoft.com/office/powerpoint/2010/main" val="3495113416"/>
+      </p:ext>
+    </p:extLst>
+  </p:cSld>
+  <p:clrMapOvr>
+    <a:masterClrMapping/>
+  </p:clrMapOvr>
+</p:notes>
+</file>
+
+<file path=ppt/notesSlides/notesSlide4.xml><?xml version="1.0" encoding="utf-8"?>
+<p:notes xmlns:a="http://schemas.openxmlformats.org/drawingml/2006/main" xmlns:r="http://schemas.openxmlformats.org/officeDocument/2006/relationships" xmlns:p="http://schemas.openxmlformats.org/presentationml/2006/main">
+  <p:cSld>
+    <p:spTree>
+      <p:nvGrpSpPr>
+        <p:cNvPr id="1" name=""/>
+        <p:cNvGrpSpPr/>
+        <p:nvPr/>
+      </p:nvGrpSpPr>
+      <p:grpSpPr>
+        <a:xfrm>
+          <a:off x="0" y="0"/>
+          <a:ext cx="0" cy="0"/>
+          <a:chOff x="0" y="0"/>
+          <a:chExt cx="0" cy="0"/>
+        </a:xfrm>
+      </p:grpSpPr>
+      <p:sp>
+        <p:nvSpPr>
+          <p:cNvPr id="2" name="Folienbildplatzhalter 1"/>
+          <p:cNvSpPr>
+            <a:spLocks noGrp="1" noRot="1" noChangeAspect="1"/>
+          </p:cNvSpPr>
+          <p:nvPr>
+            <p:ph type="sldImg"/>
+          </p:nvPr>
+        </p:nvSpPr>
+        <p:spPr/>
+      </p:sp>
+      <p:sp>
+        <p:nvSpPr>
+          <p:cNvPr id="3" name="Notizenplatzhalter 2"/>
+          <p:cNvSpPr>
+            <a:spLocks noGrp="1"/>
+          </p:cNvSpPr>
+          <p:nvPr>
+            <p:ph type="body" idx="1"/>
+          </p:nvPr>
+        </p:nvSpPr>
+        <p:spPr/>
+        <p:txBody>
+          <a:bodyPr/>
+          <a:lstStyle/>
+          <a:p>
+            <a:r>
+              <a:rPr lang="de-DE" dirty="0" smtClean="0"/>
+              <a:t>3 </a:t>
+            </a:r>
+            <a:r>
+              <a:rPr lang="de-DE" dirty="0" err="1" smtClean="0"/>
+              <a:t>collections</a:t>
+            </a:r>
+            <a:endParaRPr lang="de-DE" dirty="0" smtClean="0"/>
+          </a:p>
+          <a:p>
+            <a:r>
+              <a:rPr lang="de-DE" dirty="0" smtClean="0"/>
+              <a:t>User</a:t>
+            </a:r>
+            <a:r>
+              <a:rPr lang="de-DE" baseline="0" dirty="0" smtClean="0"/>
+              <a:t> -&gt; </a:t>
+            </a:r>
+            <a:r>
+              <a:rPr lang="de-DE" baseline="0" dirty="0" err="1" smtClean="0"/>
+              <a:t>notes.user</a:t>
+            </a:r>
+            <a:endParaRPr lang="de-DE" dirty="0" smtClean="0"/>
+          </a:p>
+          <a:p>
+            <a:endParaRPr lang="de-DE" dirty="0" smtClean="0"/>
+          </a:p>
+          <a:p>
+            <a:r>
+              <a:rPr lang="de-DE" dirty="0" smtClean="0"/>
+              <a:t>_</a:t>
+            </a:r>
+            <a:r>
+              <a:rPr lang="de-DE" dirty="0" err="1" smtClean="0"/>
+              <a:t>id</a:t>
+            </a:r>
+            <a:r>
+              <a:rPr lang="de-DE" baseline="0" dirty="0" smtClean="0"/>
+              <a:t> = </a:t>
+            </a:r>
+            <a:r>
+              <a:rPr lang="de-DE" baseline="0" dirty="0" err="1" smtClean="0"/>
+              <a:t>unique</a:t>
+            </a:r>
+            <a:endParaRPr lang="de-DE" baseline="0" dirty="0" smtClean="0"/>
+          </a:p>
+          <a:p>
+            <a:r>
+              <a:rPr lang="de-DE" baseline="0" dirty="0" err="1" smtClean="0"/>
+              <a:t>User.email</a:t>
+            </a:r>
+            <a:r>
+              <a:rPr lang="de-DE" baseline="0" dirty="0" smtClean="0"/>
+              <a:t> = </a:t>
+            </a:r>
+            <a:r>
+              <a:rPr lang="de-DE" baseline="0" dirty="0" err="1" smtClean="0"/>
+              <a:t>unique</a:t>
+            </a:r>
+            <a:endParaRPr lang="de-DE" baseline="0" dirty="0" smtClean="0"/>
+          </a:p>
+          <a:p>
+            <a:endParaRPr lang="de-DE" baseline="0" dirty="0" smtClean="0"/>
+          </a:p>
+          <a:p>
+            <a:r>
+              <a:rPr lang="de-DE" baseline="0" dirty="0" err="1" smtClean="0"/>
+              <a:t>lastModifiedDate</a:t>
+            </a:r>
+            <a:r>
+              <a:rPr lang="de-DE" baseline="0" dirty="0" smtClean="0"/>
+              <a:t> hat TTL von 24 Stunden</a:t>
+            </a:r>
+          </a:p>
+          <a:p>
+            <a:endParaRPr lang="de-DE" dirty="0"/>
+          </a:p>
+        </p:txBody>
+      </p:sp>
+      <p:sp>
+        <p:nvSpPr>
+          <p:cNvPr id="4" name="Foliennummernplatzhalter 3"/>
+          <p:cNvSpPr>
+            <a:spLocks noGrp="1"/>
+          </p:cNvSpPr>
+          <p:nvPr>
+            <p:ph type="sldNum" sz="quarter" idx="10"/>
+          </p:nvPr>
+        </p:nvSpPr>
+        <p:spPr/>
+        <p:txBody>
+          <a:bodyPr/>
+          <a:lstStyle/>
+          <a:p>
+            <a:fld id="{14BEC569-9E05-4323-A98C-4047FABAF080}" type="slidenum">
+              <a:rPr lang="de-DE" smtClean="0"/>
+              <a:t>7</a:t>
+            </a:fld>
+            <a:endParaRPr lang="de-DE"/>
+          </a:p>
+        </p:txBody>
+      </p:sp>
+    </p:spTree>
+    <p:extLst>
+      <p:ext uri="{BB962C8B-B14F-4D97-AF65-F5344CB8AC3E}">
+        <p14:creationId xmlns:p14="http://schemas.microsoft.com/office/powerpoint/2010/main" val="3471116280"/>
+      </p:ext>
+    </p:extLst>
+  </p:cSld>
+  <p:clrMapOvr>
+    <a:masterClrMapping/>
+  </p:clrMapOvr>
+</p:notes>
+</file>
+
+<file path=ppt/notesSlides/notesSlide5.xml><?xml version="1.0" encoding="utf-8"?>
+<p:notes xmlns:a="http://schemas.openxmlformats.org/drawingml/2006/main" xmlns:r="http://schemas.openxmlformats.org/officeDocument/2006/relationships" xmlns:p="http://schemas.openxmlformats.org/presentationml/2006/main">
+  <p:cSld>
+    <p:spTree>
+      <p:nvGrpSpPr>
+        <p:cNvPr id="1" name=""/>
+        <p:cNvGrpSpPr/>
+        <p:nvPr/>
+      </p:nvGrpSpPr>
+      <p:grpSpPr>
+        <a:xfrm>
+          <a:off x="0" y="0"/>
+          <a:ext cx="0" cy="0"/>
+          <a:chOff x="0" y="0"/>
+          <a:chExt cx="0" cy="0"/>
+        </a:xfrm>
+      </p:grpSpPr>
+      <p:sp>
+        <p:nvSpPr>
+          <p:cNvPr id="2" name="Folienbildplatzhalter 1"/>
+          <p:cNvSpPr>
+            <a:spLocks noGrp="1" noRot="1" noChangeAspect="1"/>
+          </p:cNvSpPr>
+          <p:nvPr>
+            <p:ph type="sldImg"/>
+          </p:nvPr>
+        </p:nvSpPr>
+        <p:spPr/>
+      </p:sp>
+      <p:sp>
+        <p:nvSpPr>
+          <p:cNvPr id="3" name="Notizenplatzhalter 2"/>
+          <p:cNvSpPr>
+            <a:spLocks noGrp="1"/>
+          </p:cNvSpPr>
+          <p:nvPr>
+            <p:ph type="body" idx="1"/>
+          </p:nvPr>
+        </p:nvSpPr>
+        <p:spPr/>
+        <p:txBody>
+          <a:bodyPr/>
+          <a:lstStyle/>
+          <a:p>
+            <a:r>
+              <a:rPr lang="de-DE" dirty="0" smtClean="0"/>
+              <a:t>Als </a:t>
+            </a:r>
+            <a:r>
+              <a:rPr lang="de-DE" dirty="0" err="1" smtClean="0"/>
+              <a:t>Technologiestack</a:t>
+            </a:r>
+            <a:r>
+              <a:rPr lang="de-DE" dirty="0" smtClean="0"/>
+              <a:t> verwenden</a:t>
+            </a:r>
+            <a:r>
+              <a:rPr lang="de-DE" baseline="0" dirty="0" smtClean="0"/>
+              <a:t> wir den MEAN-Stack</a:t>
+            </a:r>
+            <a:endParaRPr lang="de-DE" dirty="0" smtClean="0"/>
+          </a:p>
+          <a:p>
+            <a:r>
+              <a:rPr lang="de-DE" dirty="0" smtClean="0"/>
+              <a:t>Steht für</a:t>
+            </a:r>
+            <a:r>
+              <a:rPr lang="de-DE" baseline="0" dirty="0" smtClean="0"/>
+              <a:t>:</a:t>
+            </a:r>
+            <a:endParaRPr lang="de-DE" dirty="0" smtClean="0"/>
+          </a:p>
+          <a:p>
+            <a:r>
+              <a:rPr lang="de-DE" dirty="0" err="1" smtClean="0"/>
+              <a:t>MongoDB</a:t>
+            </a:r>
+            <a:r>
+              <a:rPr lang="de-DE" dirty="0" smtClean="0"/>
+              <a:t> - </a:t>
+            </a:r>
+            <a:r>
+              <a:rPr lang="de-DE" dirty="0" err="1" smtClean="0"/>
+              <a:t>Persistenzschicht</a:t>
+            </a:r>
+            <a:endParaRPr lang="de-DE" dirty="0" smtClean="0"/>
+          </a:p>
+          <a:p>
+            <a:r>
+              <a:rPr lang="de-DE" dirty="0" err="1" smtClean="0"/>
+              <a:t>ExpressJs</a:t>
+            </a:r>
+            <a:r>
+              <a:rPr lang="de-DE" dirty="0" smtClean="0"/>
+              <a:t> </a:t>
+            </a:r>
+            <a:r>
+              <a:rPr lang="de-DE" baseline="0" dirty="0" smtClean="0"/>
+              <a:t>- Server Framework</a:t>
+            </a:r>
+          </a:p>
+          <a:p>
+            <a:r>
+              <a:rPr lang="de-DE" baseline="0" dirty="0" err="1" smtClean="0"/>
+              <a:t>AngularJs</a:t>
+            </a:r>
+            <a:r>
+              <a:rPr lang="de-DE" baseline="0" dirty="0" smtClean="0"/>
+              <a:t> - Client Framework</a:t>
+            </a:r>
+          </a:p>
+          <a:p>
+            <a:r>
+              <a:rPr lang="de-DE" baseline="0" dirty="0" err="1" smtClean="0"/>
+              <a:t>NodeJs</a:t>
+            </a:r>
+            <a:r>
+              <a:rPr lang="de-DE" baseline="0" dirty="0" smtClean="0"/>
+              <a:t> – Server </a:t>
+            </a:r>
+            <a:r>
+              <a:rPr lang="de-DE" baseline="0" dirty="0" err="1" smtClean="0"/>
+              <a:t>Runtime</a:t>
+            </a:r>
+            <a:r>
+              <a:rPr lang="de-DE" baseline="0" dirty="0" smtClean="0"/>
+              <a:t> = Laufzeitumgebung</a:t>
+            </a:r>
+            <a:endParaRPr lang="de-DE" dirty="0"/>
+          </a:p>
+        </p:txBody>
+      </p:sp>
+      <p:sp>
+        <p:nvSpPr>
+          <p:cNvPr id="4" name="Foliennummernplatzhalter 3"/>
+          <p:cNvSpPr>
+            <a:spLocks noGrp="1"/>
+          </p:cNvSpPr>
+          <p:nvPr>
+            <p:ph type="sldNum" sz="quarter" idx="10"/>
+          </p:nvPr>
+        </p:nvSpPr>
+        <p:spPr/>
+        <p:txBody>
+          <a:bodyPr/>
+          <a:lstStyle/>
+          <a:p>
+            <a:fld id="{14BEC569-9E05-4323-A98C-4047FABAF080}" type="slidenum">
+              <a:rPr lang="de-DE" smtClean="0"/>
+              <a:t>8</a:t>
+            </a:fld>
+            <a:endParaRPr lang="de-DE"/>
+          </a:p>
+        </p:txBody>
+      </p:sp>
+    </p:spTree>
+    <p:extLst>
+      <p:ext uri="{BB962C8B-B14F-4D97-AF65-F5344CB8AC3E}">
+        <p14:creationId xmlns:p14="http://schemas.microsoft.com/office/powerpoint/2010/main" val="4019237998"/>
+      </p:ext>
+    </p:extLst>
+  </p:cSld>
+  <p:clrMapOvr>
+    <a:masterClrMapping/>
+  </p:clrMapOvr>
+</p:notes>
+</file>
+
+<file path=ppt/notesSlides/notesSlide6.xml><?xml version="1.0" encoding="utf-8"?>
+<p:notes xmlns:a="http://schemas.openxmlformats.org/drawingml/2006/main" xmlns:r="http://schemas.openxmlformats.org/officeDocument/2006/relationships" xmlns:p="http://schemas.openxmlformats.org/presentationml/2006/main">
+  <p:cSld>
+    <p:spTree>
+      <p:nvGrpSpPr>
+        <p:cNvPr id="1" name=""/>
+        <p:cNvGrpSpPr/>
+        <p:nvPr/>
+      </p:nvGrpSpPr>
+      <p:grpSpPr>
+        <a:xfrm>
+          <a:off x="0" y="0"/>
+          <a:ext cx="0" cy="0"/>
+          <a:chOff x="0" y="0"/>
+          <a:chExt cx="0" cy="0"/>
+        </a:xfrm>
+      </p:grpSpPr>
+      <p:sp>
+        <p:nvSpPr>
+          <p:cNvPr id="2" name="Folienbildplatzhalter 1"/>
+          <p:cNvSpPr>
+            <a:spLocks noGrp="1" noRot="1" noChangeAspect="1"/>
+          </p:cNvSpPr>
+          <p:nvPr>
+            <p:ph type="sldImg"/>
+          </p:nvPr>
+        </p:nvSpPr>
+        <p:spPr/>
+      </p:sp>
+      <p:sp>
+        <p:nvSpPr>
+          <p:cNvPr id="3" name="Notizenplatzhalter 2"/>
+          <p:cNvSpPr>
+            <a:spLocks noGrp="1"/>
+          </p:cNvSpPr>
+          <p:nvPr>
+            <p:ph type="body" idx="1"/>
+          </p:nvPr>
+        </p:nvSpPr>
+        <p:spPr/>
+        <p:txBody>
+          <a:bodyPr/>
+          <a:lstStyle/>
+          <a:p>
+            <a:r>
+              <a:rPr lang="de-DE" dirty="0" smtClean="0"/>
+              <a:t>Registrierung -&gt; E-Mail</a:t>
+            </a:r>
+            <a:r>
+              <a:rPr lang="de-DE" baseline="0" dirty="0" smtClean="0"/>
+              <a:t> Service</a:t>
+            </a:r>
+          </a:p>
+          <a:p>
+            <a:r>
+              <a:rPr lang="de-DE" baseline="0" dirty="0" smtClean="0"/>
+              <a:t>Teilen -&gt; Notizen </a:t>
+            </a:r>
+            <a:r>
+              <a:rPr lang="de-DE" baseline="0" dirty="0" err="1" smtClean="0"/>
+              <a:t>sharen</a:t>
+            </a:r>
+            <a:endParaRPr lang="de-DE" baseline="0" dirty="0" smtClean="0"/>
+          </a:p>
+          <a:p>
+            <a:r>
+              <a:rPr lang="de-DE" baseline="0" dirty="0" smtClean="0"/>
+              <a:t>Archivieren -&gt; bisher nur Delete</a:t>
+            </a:r>
+          </a:p>
+          <a:p>
+            <a:r>
+              <a:rPr lang="de-DE" baseline="0" dirty="0" smtClean="0"/>
+              <a:t>Drag &amp; Drop -&gt; bisher nach Erstellungsdatum</a:t>
+            </a:r>
+          </a:p>
+          <a:p>
+            <a:r>
+              <a:rPr lang="de-DE" baseline="0" dirty="0" smtClean="0"/>
+              <a:t>Modell erweitern -&gt; RTF-Texte, Checkliste, etc…</a:t>
+            </a:r>
+            <a:endParaRPr lang="de-DE" dirty="0"/>
+          </a:p>
+        </p:txBody>
+      </p:sp>
+      <p:sp>
+        <p:nvSpPr>
+          <p:cNvPr id="4" name="Foliennummernplatzhalter 3"/>
+          <p:cNvSpPr>
+            <a:spLocks noGrp="1"/>
+          </p:cNvSpPr>
+          <p:nvPr>
+            <p:ph type="sldNum" sz="quarter" idx="10"/>
+          </p:nvPr>
+        </p:nvSpPr>
+        <p:spPr/>
+        <p:txBody>
+          <a:bodyPr/>
+          <a:lstStyle/>
+          <a:p>
+            <a:fld id="{14BEC569-9E05-4323-A98C-4047FABAF080}" type="slidenum">
+              <a:rPr lang="de-DE" smtClean="0"/>
+              <a:t>11</a:t>
+            </a:fld>
+            <a:endParaRPr lang="de-DE"/>
+          </a:p>
+        </p:txBody>
+      </p:sp>
+    </p:spTree>
+    <p:extLst>
+      <p:ext uri="{BB962C8B-B14F-4D97-AF65-F5344CB8AC3E}">
+        <p14:creationId xmlns:p14="http://schemas.microsoft.com/office/powerpoint/2010/main" val="3168051213"/>
+      </p:ext>
+    </p:extLst>
+  </p:cSld>
+  <p:clrMapOvr>
+    <a:masterClrMapping/>
+  </p:clrMapOvr>
+</p:notes>
+</file>
+
 <file path=ppt/slideLayouts/slideLayout1.xml><?xml version="1.0" encoding="utf-8"?>
 <p:sldLayout xmlns:a="http://schemas.openxmlformats.org/drawingml/2006/main" xmlns:r="http://schemas.openxmlformats.org/officeDocument/2006/relationships" xmlns:p="http://schemas.openxmlformats.org/presentationml/2006/main" showMasterSp="0" type="title" preserve="1">
   <p:cSld name="Titelfolie">
@@ -10190,7 +11339,7 @@
           <a:p>
             <a:r>
               <a:rPr lang="de-DE" dirty="0" smtClean="0"/>
-              <a:t>Aussicht</a:t>
+              <a:t>Zeigen</a:t>
             </a:r>
             <a:endParaRPr lang="de-DE" dirty="0"/>
           </a:p>
@@ -10208,6 +11357,88 @@
         </p:nvSpPr>
         <p:spPr/>
         <p:txBody>
+          <a:bodyPr/>
+          <a:lstStyle/>
+          <a:p>
+            <a:r>
+              <a:rPr lang="de-DE" dirty="0"/>
+              <a:t>http://localhost:3030/client/</a:t>
+            </a:r>
+          </a:p>
+        </p:txBody>
+      </p:sp>
+    </p:spTree>
+    <p:extLst>
+      <p:ext uri="{BB962C8B-B14F-4D97-AF65-F5344CB8AC3E}">
+        <p14:creationId xmlns:p14="http://schemas.microsoft.com/office/powerpoint/2010/main" val="2430726244"/>
+      </p:ext>
+    </p:extLst>
+  </p:cSld>
+  <p:clrMapOvr>
+    <a:masterClrMapping/>
+  </p:clrMapOvr>
+  <p:timing>
+    <p:tnLst>
+      <p:par>
+        <p:cTn id="1" dur="indefinite" restart="never" nodeType="tmRoot"/>
+      </p:par>
+    </p:tnLst>
+  </p:timing>
+</p:sld>
+</file>
+
+<file path=ppt/slides/slide11.xml><?xml version="1.0" encoding="utf-8"?>
+<p:sld xmlns:a="http://schemas.openxmlformats.org/drawingml/2006/main" xmlns:r="http://schemas.openxmlformats.org/officeDocument/2006/relationships" xmlns:p="http://schemas.openxmlformats.org/presentationml/2006/main">
+  <p:cSld>
+    <p:spTree>
+      <p:nvGrpSpPr>
+        <p:cNvPr id="1" name=""/>
+        <p:cNvGrpSpPr/>
+        <p:nvPr/>
+      </p:nvGrpSpPr>
+      <p:grpSpPr>
+        <a:xfrm>
+          <a:off x="0" y="0"/>
+          <a:ext cx="0" cy="0"/>
+          <a:chOff x="0" y="0"/>
+          <a:chExt cx="0" cy="0"/>
+        </a:xfrm>
+      </p:grpSpPr>
+      <p:sp>
+        <p:nvSpPr>
+          <p:cNvPr id="2" name="Titel 1"/>
+          <p:cNvSpPr>
+            <a:spLocks noGrp="1"/>
+          </p:cNvSpPr>
+          <p:nvPr>
+            <p:ph type="title"/>
+          </p:nvPr>
+        </p:nvSpPr>
+        <p:spPr/>
+        <p:txBody>
+          <a:bodyPr/>
+          <a:lstStyle/>
+          <a:p>
+            <a:r>
+              <a:rPr lang="de-DE" dirty="0" smtClean="0"/>
+              <a:t>Aussicht</a:t>
+            </a:r>
+            <a:endParaRPr lang="de-DE" dirty="0"/>
+          </a:p>
+        </p:txBody>
+      </p:sp>
+      <p:sp>
+        <p:nvSpPr>
+          <p:cNvPr id="3" name="Inhaltsplatzhalter 2"/>
+          <p:cNvSpPr>
+            <a:spLocks noGrp="1"/>
+          </p:cNvSpPr>
+          <p:nvPr>
+            <p:ph idx="1"/>
+          </p:nvPr>
+        </p:nvSpPr>
+        <p:spPr/>
+        <p:txBody>
           <a:bodyPr>
             <a:normAutofit/>
           </a:bodyPr>
@@ -10263,12 +11494,12 @@
           <a:p>
             <a:pPr lvl="0"/>
             <a:r>
-              <a:rPr lang="de-DE" dirty="0" err="1" smtClean="0"/>
-              <a:t>Notzienmodell</a:t>
-            </a:r>
-            <a:r>
               <a:rPr lang="de-DE" dirty="0" smtClean="0"/>
-              <a:t> erweitern</a:t>
+              <a:t>Notizenmodell </a:t>
+            </a:r>
+            <a:r>
+              <a:rPr lang="de-DE" dirty="0" smtClean="0"/>
+              <a:t>erweitern</a:t>
             </a:r>
             <a:endParaRPr lang="de-DE" dirty="0"/>
           </a:p>
@@ -10297,7 +11528,7 @@
 </p:sld>
 </file>
 
-<file path=ppt/slides/slide11.xml><?xml version="1.0" encoding="utf-8"?>
+<file path=ppt/slides/slide12.xml><?xml version="1.0" encoding="utf-8"?>
 <p:sld xmlns:a="http://schemas.openxmlformats.org/drawingml/2006/main" xmlns:r="http://schemas.openxmlformats.org/officeDocument/2006/relationships" xmlns:p="http://schemas.openxmlformats.org/presentationml/2006/main">
   <p:cSld>
     <p:spTree>
@@ -10484,7 +11715,7 @@
           <p:nvPr/>
         </p:nvPicPr>
         <p:blipFill>
-          <a:blip r:embed="rId2">
+          <a:blip r:embed="rId3">
             <a:extLst>
               <a:ext uri="{28A0092B-C50C-407E-A947-70E740481C1C}">
                 <a14:useLocalDpi xmlns:a14="http://schemas.microsoft.com/office/drawing/2010/main" val="0"/>
@@ -11537,7 +12768,7 @@
           </p:nvPr>
         </p:nvPicPr>
         <p:blipFill>
-          <a:blip r:embed="rId2">
+          <a:blip r:embed="rId3">
             <a:extLst>
               <a:ext uri="{28A0092B-C50C-407E-A947-70E740481C1C}">
                 <a14:useLocalDpi xmlns:a14="http://schemas.microsoft.com/office/drawing/2010/main" val="0"/>
@@ -11566,7 +12797,7 @@
           </p:nvPr>
         </p:nvPicPr>
         <p:blipFill>
-          <a:blip r:embed="rId3">
+          <a:blip r:embed="rId4">
             <a:extLst>
               <a:ext uri="{28A0092B-C50C-407E-A947-70E740481C1C}">
                 <a14:useLocalDpi xmlns:a14="http://schemas.microsoft.com/office/drawing/2010/main" val="0"/>
@@ -11662,7 +12893,7 @@
           </p:nvPr>
         </p:nvPicPr>
         <p:blipFill>
-          <a:blip r:embed="rId2">
+          <a:blip r:embed="rId3">
             <a:extLst>
               <a:ext uri="{28A0092B-C50C-407E-A947-70E740481C1C}">
                 <a14:useLocalDpi xmlns:a14="http://schemas.microsoft.com/office/drawing/2010/main" val="0"/>
@@ -11691,7 +12922,7 @@
           </p:nvPr>
         </p:nvPicPr>
         <p:blipFill>
-          <a:blip r:embed="rId3">
+          <a:blip r:embed="rId4">
             <a:extLst>
               <a:ext uri="{28A0092B-C50C-407E-A947-70E740481C1C}">
                 <a14:useLocalDpi xmlns:a14="http://schemas.microsoft.com/office/drawing/2010/main" val="0"/>
@@ -11786,7 +13017,7 @@
             <p:ph idx="1"/>
             <p:extLst>
               <p:ext uri="{D42A27DB-BD31-4B8C-83A1-F6EECF244321}">
-                <p14:modId xmlns:p14="http://schemas.microsoft.com/office/powerpoint/2010/main" val="3258014348"/>
+                <p14:modId xmlns:p14="http://schemas.microsoft.com/office/powerpoint/2010/main" val="3384200910"/>
               </p:ext>
             </p:extLst>
           </p:nvPr>
@@ -11797,7 +13028,7 @@
         </p:xfrm>
         <a:graphic>
           <a:graphicData uri="http://schemas.openxmlformats.org/drawingml/2006/diagram">
-            <dgm:relIds xmlns:dgm="http://schemas.openxmlformats.org/drawingml/2006/diagram" xmlns:r="http://schemas.openxmlformats.org/officeDocument/2006/relationships" r:dm="rId2" r:lo="rId3" r:qs="rId4" r:cs="rId5"/>
+            <dgm:relIds xmlns:dgm="http://schemas.openxmlformats.org/drawingml/2006/diagram" xmlns:r="http://schemas.openxmlformats.org/officeDocument/2006/relationships" r:dm="rId3" r:lo="rId4" r:qs="rId5" r:cs="rId6"/>
           </a:graphicData>
         </a:graphic>
       </p:graphicFrame>
@@ -11879,7 +13110,7 @@
           </p:nvPr>
         </p:nvPicPr>
         <p:blipFill>
-          <a:blip r:embed="rId2">
+          <a:blip r:embed="rId3">
             <a:extLst>
               <a:ext uri="{28A0092B-C50C-407E-A947-70E740481C1C}">
                 <a14:useLocalDpi xmlns:a14="http://schemas.microsoft.com/office/drawing/2010/main" val="0"/>
@@ -11906,7 +13137,7 @@
           <p:nvPr/>
         </p:nvPicPr>
         <p:blipFill>
-          <a:blip r:embed="rId3">
+          <a:blip r:embed="rId4">
             <a:extLst>
               <a:ext uri="{28A0092B-C50C-407E-A947-70E740481C1C}">
                 <a14:useLocalDpi xmlns:a14="http://schemas.microsoft.com/office/drawing/2010/main" val="0"/>
@@ -11936,7 +13167,7 @@
           <p:nvPr/>
         </p:nvPicPr>
         <p:blipFill>
-          <a:blip r:embed="rId4">
+          <a:blip r:embed="rId5">
             <a:extLst>
               <a:ext uri="{28A0092B-C50C-407E-A947-70E740481C1C}">
                 <a14:useLocalDpi xmlns:a14="http://schemas.microsoft.com/office/drawing/2010/main" val="0"/>
@@ -11966,7 +13197,7 @@
           <p:nvPr/>
         </p:nvPicPr>
         <p:blipFill>
-          <a:blip r:embed="rId5">
+          <a:blip r:embed="rId6">
             <a:extLst>
               <a:ext uri="{28A0092B-C50C-407E-A947-70E740481C1C}">
                 <a14:useLocalDpi xmlns:a14="http://schemas.microsoft.com/office/drawing/2010/main" val="0"/>
@@ -13346,4 +14577,265 @@
     </a:ext>
   </a:extLst>
 </a:theme>
+</file>
+
+<file path=ppt/theme/theme2.xml><?xml version="1.0" encoding="utf-8"?>
+<a:theme xmlns:a="http://schemas.openxmlformats.org/drawingml/2006/main" name="Office Theme">
+  <a:themeElements>
+    <a:clrScheme name="Office">
+      <a:dk1>
+        <a:sysClr val="windowText" lastClr="000000"/>
+      </a:dk1>
+      <a:lt1>
+        <a:sysClr val="window" lastClr="FFFFFF"/>
+      </a:lt1>
+      <a:dk2>
+        <a:srgbClr val="44546A"/>
+      </a:dk2>
+      <a:lt2>
+        <a:srgbClr val="E7E6E6"/>
+      </a:lt2>
+      <a:accent1>
+        <a:srgbClr val="5B9BD5"/>
+      </a:accent1>
+      <a:accent2>
+        <a:srgbClr val="ED7D31"/>
+      </a:accent2>
+      <a:accent3>
+        <a:srgbClr val="A5A5A5"/>
+      </a:accent3>
+      <a:accent4>
+        <a:srgbClr val="FFC000"/>
+      </a:accent4>
+      <a:accent5>
+        <a:srgbClr val="4472C4"/>
+      </a:accent5>
+      <a:accent6>
+        <a:srgbClr val="70AD47"/>
+      </a:accent6>
+      <a:hlink>
+        <a:srgbClr val="0563C1"/>
+      </a:hlink>
+      <a:folHlink>
+        <a:srgbClr val="954F72"/>
+      </a:folHlink>
+    </a:clrScheme>
+    <a:fontScheme name="Office">
+      <a:majorFont>
+        <a:latin typeface="Calibri Light" panose="020F0302020204030204"/>
+        <a:ea typeface=""/>
+        <a:cs typeface=""/>
+        <a:font script="Jpan" typeface="ＭＳ Ｐゴシック"/>
+        <a:font script="Hang" typeface="맑은 고딕"/>
+        <a:font script="Hans" typeface="宋体"/>
+        <a:font script="Hant" typeface="新細明體"/>
+        <a:font script="Arab" typeface="Times New Roman"/>
+        <a:font script="Hebr" typeface="Times New Roman"/>
+        <a:font script="Thai" typeface="Angsana New"/>
+        <a:font script="Ethi" typeface="Nyala"/>
+        <a:font script="Beng" typeface="Vrinda"/>
+        <a:font script="Gujr" typeface="Shruti"/>
+        <a:font script="Khmr" typeface="MoolBoran"/>
+        <a:font script="Knda" typeface="Tunga"/>
+        <a:font script="Guru" typeface="Raavi"/>
+        <a:font script="Cans" typeface="Euphemia"/>
+        <a:font script="Cher" typeface="Plantagenet Cherokee"/>
+        <a:font script="Yiii" typeface="Microsoft Yi Baiti"/>
+        <a:font script="Tibt" typeface="Microsoft Himalaya"/>
+        <a:font script="Thaa" typeface="MV Boli"/>
+        <a:font script="Deva" typeface="Mangal"/>
+        <a:font script="Telu" typeface="Gautami"/>
+        <a:font script="Taml" typeface="Latha"/>
+        <a:font script="Syrc" typeface="Estrangelo Edessa"/>
+        <a:font script="Orya" typeface="Kalinga"/>
+        <a:font script="Mlym" typeface="Kartika"/>
+        <a:font script="Laoo" typeface="DokChampa"/>
+        <a:font script="Sinh" typeface="Iskoola Pota"/>
+        <a:font script="Mong" typeface="Mongolian Baiti"/>
+        <a:font script="Viet" typeface="Times New Roman"/>
+        <a:font script="Uigh" typeface="Microsoft Uighur"/>
+        <a:font script="Geor" typeface="Sylfaen"/>
+      </a:majorFont>
+      <a:minorFont>
+        <a:latin typeface="Calibri" panose="020F0502020204030204"/>
+        <a:ea typeface=""/>
+        <a:cs typeface=""/>
+        <a:font script="Jpan" typeface="ＭＳ Ｐゴシック"/>
+        <a:font script="Hang" typeface="맑은 고딕"/>
+        <a:font script="Hans" typeface="宋体"/>
+        <a:font script="Hant" typeface="新細明體"/>
+        <a:font script="Arab" typeface="Arial"/>
+        <a:font script="Hebr" typeface="Arial"/>
+        <a:font script="Thai" typeface="Cordia New"/>
+        <a:font script="Ethi" typeface="Nyala"/>
+        <a:font script="Beng" typeface="Vrinda"/>
+        <a:font script="Gujr" typeface="Shruti"/>
+        <a:font script="Khmr" typeface="DaunPenh"/>
+        <a:font script="Knda" typeface="Tunga"/>
+        <a:font script="Guru" typeface="Raavi"/>
+        <a:font script="Cans" typeface="Euphemia"/>
+        <a:font script="Cher" typeface="Plantagenet Cherokee"/>
+        <a:font script="Yiii" typeface="Microsoft Yi Baiti"/>
+        <a:font script="Tibt" typeface="Microsoft Himalaya"/>
+        <a:font script="Thaa" typeface="MV Boli"/>
+        <a:font script="Deva" typeface="Mangal"/>
+        <a:font script="Telu" typeface="Gautami"/>
+        <a:font script="Taml" typeface="Latha"/>
+        <a:font script="Syrc" typeface="Estrangelo Edessa"/>
+        <a:font script="Orya" typeface="Kalinga"/>
+        <a:font script="Mlym" typeface="Kartika"/>
+        <a:font script="Laoo" typeface="DokChampa"/>
+        <a:font script="Sinh" typeface="Iskoola Pota"/>
+        <a:font script="Mong" typeface="Mongolian Baiti"/>
+        <a:font script="Viet" typeface="Arial"/>
+        <a:font script="Uigh" typeface="Microsoft Uighur"/>
+        <a:font script="Geor" typeface="Sylfaen"/>
+      </a:minorFont>
+    </a:fontScheme>
+    <a:fmtScheme name="Office">
+      <a:fillStyleLst>
+        <a:solidFill>
+          <a:schemeClr val="phClr"/>
+        </a:solidFill>
+        <a:gradFill rotWithShape="1">
+          <a:gsLst>
+            <a:gs pos="0">
+              <a:schemeClr val="phClr">
+                <a:lumMod val="110000"/>
+                <a:satMod val="105000"/>
+                <a:tint val="67000"/>
+              </a:schemeClr>
+            </a:gs>
+            <a:gs pos="50000">
+              <a:schemeClr val="phClr">
+                <a:lumMod val="105000"/>
+                <a:satMod val="103000"/>
+                <a:tint val="73000"/>
+              </a:schemeClr>
+            </a:gs>
+            <a:gs pos="100000">
+              <a:schemeClr val="phClr">
+                <a:lumMod val="105000"/>
+                <a:satMod val="109000"/>
+                <a:tint val="81000"/>
+              </a:schemeClr>
+            </a:gs>
+          </a:gsLst>
+          <a:lin ang="5400000" scaled="0"/>
+        </a:gradFill>
+        <a:gradFill rotWithShape="1">
+          <a:gsLst>
+            <a:gs pos="0">
+              <a:schemeClr val="phClr">
+                <a:satMod val="103000"/>
+                <a:lumMod val="102000"/>
+                <a:tint val="94000"/>
+              </a:schemeClr>
+            </a:gs>
+            <a:gs pos="50000">
+              <a:schemeClr val="phClr">
+                <a:satMod val="110000"/>
+                <a:lumMod val="100000"/>
+                <a:shade val="100000"/>
+              </a:schemeClr>
+            </a:gs>
+            <a:gs pos="100000">
+              <a:schemeClr val="phClr">
+                <a:lumMod val="99000"/>
+                <a:satMod val="120000"/>
+                <a:shade val="78000"/>
+              </a:schemeClr>
+            </a:gs>
+          </a:gsLst>
+          <a:lin ang="5400000" scaled="0"/>
+        </a:gradFill>
+      </a:fillStyleLst>
+      <a:lnStyleLst>
+        <a:ln w="6350" cap="flat" cmpd="sng" algn="ctr">
+          <a:solidFill>
+            <a:schemeClr val="phClr"/>
+          </a:solidFill>
+          <a:prstDash val="solid"/>
+          <a:miter lim="800000"/>
+        </a:ln>
+        <a:ln w="12700" cap="flat" cmpd="sng" algn="ctr">
+          <a:solidFill>
+            <a:schemeClr val="phClr"/>
+          </a:solidFill>
+          <a:prstDash val="solid"/>
+          <a:miter lim="800000"/>
+        </a:ln>
+        <a:ln w="19050" cap="flat" cmpd="sng" algn="ctr">
+          <a:solidFill>
+            <a:schemeClr val="phClr"/>
+          </a:solidFill>
+          <a:prstDash val="solid"/>
+          <a:miter lim="800000"/>
+        </a:ln>
+      </a:lnStyleLst>
+      <a:effectStyleLst>
+        <a:effectStyle>
+          <a:effectLst/>
+        </a:effectStyle>
+        <a:effectStyle>
+          <a:effectLst/>
+        </a:effectStyle>
+        <a:effectStyle>
+          <a:effectLst>
+            <a:outerShdw blurRad="57150" dist="19050" dir="5400000" algn="ctr" rotWithShape="0">
+              <a:srgbClr val="000000">
+                <a:alpha val="63000"/>
+              </a:srgbClr>
+            </a:outerShdw>
+          </a:effectLst>
+        </a:effectStyle>
+      </a:effectStyleLst>
+      <a:bgFillStyleLst>
+        <a:solidFill>
+          <a:schemeClr val="phClr"/>
+        </a:solidFill>
+        <a:solidFill>
+          <a:schemeClr val="phClr">
+            <a:tint val="95000"/>
+            <a:satMod val="170000"/>
+          </a:schemeClr>
+        </a:solidFill>
+        <a:gradFill rotWithShape="1">
+          <a:gsLst>
+            <a:gs pos="0">
+              <a:schemeClr val="phClr">
+                <a:tint val="93000"/>
+                <a:satMod val="150000"/>
+                <a:shade val="98000"/>
+                <a:lumMod val="102000"/>
+              </a:schemeClr>
+            </a:gs>
+            <a:gs pos="50000">
+              <a:schemeClr val="phClr">
+                <a:tint val="98000"/>
+                <a:satMod val="130000"/>
+                <a:shade val="90000"/>
+                <a:lumMod val="103000"/>
+              </a:schemeClr>
+            </a:gs>
+            <a:gs pos="100000">
+              <a:schemeClr val="phClr">
+                <a:shade val="63000"/>
+                <a:satMod val="120000"/>
+              </a:schemeClr>
+            </a:gs>
+          </a:gsLst>
+          <a:lin ang="5400000" scaled="0"/>
+        </a:gradFill>
+      </a:bgFillStyleLst>
+    </a:fmtScheme>
+  </a:themeElements>
+  <a:objectDefaults/>
+  <a:extraClrSchemeLst/>
+  <a:extLst>
+    <a:ext uri="{05A4C25C-085E-4340-85A3-A5531E510DB2}">
+      <thm15:themeFamily xmlns:thm15="http://schemas.microsoft.com/office/thememl/2012/main" name="Office Theme" id="{62F939B6-93AF-4DB8-9C6B-D6C7DFDC589F}" vid="{4A3C46E8-61CC-4603-A589-7422A47A8E4A}"/>
+    </a:ext>
+  </a:extLst>
+</a:theme>
 </file>
</xml_diff>

<commit_message>
Some more Comments on PP
</commit_message>
<xml_diff>
--- a/doc/Präsentation/MEAN Notes.pptx
+++ b/doc/Präsentation/MEAN Notes.pptx
@@ -1986,8 +1986,8 @@
     <dgm:cxn modelId="{0577D253-1036-47A8-B810-A735390FEBE6}" srcId="{A6B4E31E-BF13-43E9-A8DF-1D0CED72AE2B}" destId="{0A180470-D629-4A2F-A707-AC08E7EE7821}" srcOrd="1" destOrd="0" parTransId="{E8C6D964-0C3D-4EE5-93FE-EB8BA448D4DC}" sibTransId="{AEB55458-9C91-4297-89D4-34C873B7BFA6}"/>
     <dgm:cxn modelId="{D39F9551-7A9C-4BBA-B9B5-58E7BD540672}" srcId="{45D67FC7-9484-4BD2-96D9-5DC0D4DC919F}" destId="{D43A8187-F70D-4382-97AF-2C1BAAAD39F2}" srcOrd="3" destOrd="0" parTransId="{B3AF1AFC-2EFD-470D-8334-5BB3800BEAE5}" sibTransId="{BA38E681-6A32-4A4F-9143-88D4B0706EAC}"/>
     <dgm:cxn modelId="{327244BB-FF70-480C-8140-C95AD341320E}" srcId="{0A180470-D629-4A2F-A707-AC08E7EE7821}" destId="{402C3787-C119-4975-B2C3-FDC33B51A950}" srcOrd="3" destOrd="0" parTransId="{6C90D17A-25EE-471C-B063-6FEBC0DB6C7E}" sibTransId="{8534571D-9358-468F-8107-890062D306FB}"/>
+    <dgm:cxn modelId="{A5B0E6D2-FDF1-4B66-A937-34E78F3A23F4}" srcId="{45D67FC7-9484-4BD2-96D9-5DC0D4DC919F}" destId="{A2BFB9B8-DC9E-4DB2-A6FC-2E8A7188049F}" srcOrd="4" destOrd="0" parTransId="{01F339B7-F73F-4572-AB8B-4F804846FC8A}" sibTransId="{6EE000F8-9836-427C-94FC-658B005FF7FA}"/>
     <dgm:cxn modelId="{5607A11E-0468-4EA4-B201-3E27E70E1982}" type="presOf" srcId="{C3379581-7EC1-4BC6-8381-BAFCA1887E1F}" destId="{F5E4AB33-7C02-4210-A409-8AD4743E5C7F}" srcOrd="0" destOrd="0" presId="urn:microsoft.com/office/officeart/2005/8/layout/hList1"/>
-    <dgm:cxn modelId="{A5B0E6D2-FDF1-4B66-A937-34E78F3A23F4}" srcId="{45D67FC7-9484-4BD2-96D9-5DC0D4DC919F}" destId="{A2BFB9B8-DC9E-4DB2-A6FC-2E8A7188049F}" srcOrd="4" destOrd="0" parTransId="{01F339B7-F73F-4572-AB8B-4F804846FC8A}" sibTransId="{6EE000F8-9836-427C-94FC-658B005FF7FA}"/>
     <dgm:cxn modelId="{E4929EAA-58F6-4332-AB15-6A9CB3579A7D}" srcId="{B76DA727-A040-4538-8008-3CDD5AF6C4CD}" destId="{74DCB112-97B7-43B7-B971-E99A399335BB}" srcOrd="1" destOrd="0" parTransId="{C132FE06-D957-410B-891C-7E9D715895E2}" sibTransId="{3DB06AFA-5E0D-464A-B73D-EF233128865A}"/>
     <dgm:cxn modelId="{F77FF049-E61B-42EA-8C8E-9F2E95115064}" type="presOf" srcId="{7D1F6B58-A72A-43D8-9441-9AFAF2A7FBC3}" destId="{FFF38D35-7D94-4F39-9648-B2AB98F610BE}" srcOrd="0" destOrd="5" presId="urn:microsoft.com/office/officeart/2005/8/layout/hList1"/>
     <dgm:cxn modelId="{5F309194-1D4F-4428-BD83-CF4A32D3DD0B}" type="presOf" srcId="{45D67FC7-9484-4BD2-96D9-5DC0D4DC919F}" destId="{408356D3-9949-4E29-8747-B7EE15A2C512}" srcOrd="0" destOrd="0" presId="urn:microsoft.com/office/officeart/2005/8/layout/hList1"/>
@@ -2003,8 +2003,8 @@
     <dgm:cxn modelId="{A64AE706-5337-4E33-921C-F3A7DC78317B}" type="presOf" srcId="{4D15D454-5719-43AD-ABCB-88009645E105}" destId="{E2FEDD15-6C55-4357-B7C9-D7888B6098CA}" srcOrd="0" destOrd="4" presId="urn:microsoft.com/office/officeart/2005/8/layout/hList1"/>
     <dgm:cxn modelId="{BF47847D-E076-4325-B057-D7CDBECFFEAC}" type="presOf" srcId="{5AA5FD75-5C90-4429-96FE-EA28159F142D}" destId="{19E0F596-C569-49EE-A858-0212E44E8361}" srcOrd="0" destOrd="0" presId="urn:microsoft.com/office/officeart/2005/8/layout/hList1"/>
     <dgm:cxn modelId="{9F665977-5822-484D-8DE1-963728038FAD}" type="presOf" srcId="{A1DBACA7-05CB-48CB-9B53-54FBCB2A5237}" destId="{E2FEDD15-6C55-4357-B7C9-D7888B6098CA}" srcOrd="0" destOrd="1" presId="urn:microsoft.com/office/officeart/2005/8/layout/hList1"/>
+    <dgm:cxn modelId="{BA27A05B-FD7F-4922-99CF-4CC7281017F3}" type="presOf" srcId="{1C7766AA-29C1-428A-BEF5-8CE292095754}" destId="{E2FEDD15-6C55-4357-B7C9-D7888B6098CA}" srcOrd="0" destOrd="0" presId="urn:microsoft.com/office/officeart/2005/8/layout/hList1"/>
     <dgm:cxn modelId="{DD694FD2-C66C-4BBD-B4FC-2B82FFE3651A}" type="presOf" srcId="{0A180470-D629-4A2F-A707-AC08E7EE7821}" destId="{CEB00F75-F7C3-4B6C-8DA8-4BE0DDA62DD1}" srcOrd="0" destOrd="0" presId="urn:microsoft.com/office/officeart/2005/8/layout/hList1"/>
-    <dgm:cxn modelId="{BA27A05B-FD7F-4922-99CF-4CC7281017F3}" type="presOf" srcId="{1C7766AA-29C1-428A-BEF5-8CE292095754}" destId="{E2FEDD15-6C55-4357-B7C9-D7888B6098CA}" srcOrd="0" destOrd="0" presId="urn:microsoft.com/office/officeart/2005/8/layout/hList1"/>
     <dgm:cxn modelId="{24F47EC5-40EB-4A7E-BF36-CF1B2EC345A0}" type="presOf" srcId="{844E8EA2-E497-4CA3-B913-F411BEDF9016}" destId="{FFF38D35-7D94-4F39-9648-B2AB98F610BE}" srcOrd="0" destOrd="7" presId="urn:microsoft.com/office/officeart/2005/8/layout/hList1"/>
     <dgm:cxn modelId="{23F1E98B-ABBC-4F70-A0CB-04E81DF0C8D2}" type="presOf" srcId="{26495795-AD98-421D-933B-5002B29E1146}" destId="{E2FEDD15-6C55-4357-B7C9-D7888B6098CA}" srcOrd="0" destOrd="5" presId="urn:microsoft.com/office/officeart/2005/8/layout/hList1"/>
     <dgm:cxn modelId="{AE71030A-1423-47FE-B3FA-C158896A68C8}" srcId="{5AA5FD75-5C90-4429-96FE-EA28159F142D}" destId="{28DA6E57-6E4A-46E2-8F73-AB7912C84143}" srcOrd="2" destOrd="0" parTransId="{375877AB-1F99-4D60-B5EC-F6E910E9DEAD}" sibTransId="{95EBC766-07AF-44C1-BC8F-52303DEBD8A7}"/>
@@ -4355,7 +4355,7 @@
           <a:p>
             <a:fld id="{9533D94C-F366-49B4-85A2-9678B09A1231}" type="datetimeFigureOut">
               <a:rPr lang="de-DE" smtClean="0"/>
-              <a:t>10.02.2016</a:t>
+              <a:t>11.02.2016</a:t>
             </a:fld>
             <a:endParaRPr lang="de-DE"/>
           </a:p>
@@ -4707,6 +4707,127 @@
 </p:notes>
 </file>
 
+<file path=ppt/notesSlides/notesSlide10.xml><?xml version="1.0" encoding="utf-8"?>
+<p:notes xmlns:a="http://schemas.openxmlformats.org/drawingml/2006/main" xmlns:r="http://schemas.openxmlformats.org/officeDocument/2006/relationships" xmlns:p="http://schemas.openxmlformats.org/presentationml/2006/main">
+  <p:cSld>
+    <p:spTree>
+      <p:nvGrpSpPr>
+        <p:cNvPr id="1" name=""/>
+        <p:cNvGrpSpPr/>
+        <p:nvPr/>
+      </p:nvGrpSpPr>
+      <p:grpSpPr>
+        <a:xfrm>
+          <a:off x="0" y="0"/>
+          <a:ext cx="0" cy="0"/>
+          <a:chOff x="0" y="0"/>
+          <a:chExt cx="0" cy="0"/>
+        </a:xfrm>
+      </p:grpSpPr>
+      <p:sp>
+        <p:nvSpPr>
+          <p:cNvPr id="2" name="Folienbildplatzhalter 1"/>
+          <p:cNvSpPr>
+            <a:spLocks noGrp="1" noRot="1" noChangeAspect="1"/>
+          </p:cNvSpPr>
+          <p:nvPr>
+            <p:ph type="sldImg"/>
+          </p:nvPr>
+        </p:nvSpPr>
+        <p:spPr/>
+      </p:sp>
+      <p:sp>
+        <p:nvSpPr>
+          <p:cNvPr id="3" name="Notizenplatzhalter 2"/>
+          <p:cNvSpPr>
+            <a:spLocks noGrp="1"/>
+          </p:cNvSpPr>
+          <p:nvPr>
+            <p:ph type="body" idx="1"/>
+          </p:nvPr>
+        </p:nvSpPr>
+        <p:spPr/>
+        <p:txBody>
+          <a:bodyPr/>
+          <a:lstStyle/>
+          <a:p>
+            <a:r>
+              <a:rPr lang="de-DE" dirty="0" smtClean="0"/>
+              <a:t>Registrierung -&gt; E-Mail</a:t>
+            </a:r>
+            <a:r>
+              <a:rPr lang="de-DE" baseline="0" dirty="0" smtClean="0"/>
+              <a:t> Service</a:t>
+            </a:r>
+          </a:p>
+          <a:p>
+            <a:r>
+              <a:rPr lang="de-DE" baseline="0" dirty="0" smtClean="0"/>
+              <a:t>Teilen -&gt; Notizen </a:t>
+            </a:r>
+            <a:r>
+              <a:rPr lang="de-DE" baseline="0" dirty="0" err="1" smtClean="0"/>
+              <a:t>sharen</a:t>
+            </a:r>
+            <a:endParaRPr lang="de-DE" baseline="0" dirty="0" smtClean="0"/>
+          </a:p>
+          <a:p>
+            <a:r>
+              <a:rPr lang="de-DE" baseline="0" dirty="0" smtClean="0"/>
+              <a:t>Archivieren -&gt; bisher nur Delete</a:t>
+            </a:r>
+          </a:p>
+          <a:p>
+            <a:r>
+              <a:rPr lang="de-DE" baseline="0" dirty="0" smtClean="0"/>
+              <a:t>Drag &amp; Drop -&gt; bisher nach Erstellungsdatum</a:t>
+            </a:r>
+          </a:p>
+          <a:p>
+            <a:r>
+              <a:rPr lang="de-DE" baseline="0" dirty="0" smtClean="0"/>
+              <a:t>Modell erweitern -&gt; RTF-Texte, Checkliste, etc…</a:t>
+            </a:r>
+            <a:endParaRPr lang="de-DE" dirty="0"/>
+          </a:p>
+        </p:txBody>
+      </p:sp>
+      <p:sp>
+        <p:nvSpPr>
+          <p:cNvPr id="4" name="Foliennummernplatzhalter 3"/>
+          <p:cNvSpPr>
+            <a:spLocks noGrp="1"/>
+          </p:cNvSpPr>
+          <p:nvPr>
+            <p:ph type="sldNum" sz="quarter" idx="10"/>
+          </p:nvPr>
+        </p:nvSpPr>
+        <p:spPr/>
+        <p:txBody>
+          <a:bodyPr/>
+          <a:lstStyle/>
+          <a:p>
+            <a:fld id="{14BEC569-9E05-4323-A98C-4047FABAF080}" type="slidenum">
+              <a:rPr lang="de-DE" smtClean="0"/>
+              <a:t>10</a:t>
+            </a:fld>
+            <a:endParaRPr lang="de-DE"/>
+          </a:p>
+        </p:txBody>
+      </p:sp>
+    </p:spTree>
+    <p:extLst>
+      <p:ext uri="{BB962C8B-B14F-4D97-AF65-F5344CB8AC3E}">
+        <p14:creationId xmlns:p14="http://schemas.microsoft.com/office/powerpoint/2010/main" val="3168051213"/>
+      </p:ext>
+    </p:extLst>
+  </p:cSld>
+  <p:clrMapOvr>
+    <a:masterClrMapping/>
+  </p:clrMapOvr>
+</p:notes>
+</file>
+
 <file path=ppt/notesSlides/notesSlide2.xml><?xml version="1.0" encoding="utf-8"?>
 <p:notes xmlns:a="http://schemas.openxmlformats.org/drawingml/2006/main" xmlns:r="http://schemas.openxmlformats.org/officeDocument/2006/relationships" xmlns:p="http://schemas.openxmlformats.org/presentationml/2006/main">
   <p:cSld>
@@ -4844,12 +4965,16 @@
           <a:lstStyle/>
           <a:p>
             <a:r>
+              <a:rPr lang="de-DE" dirty="0" smtClean="0"/>
+              <a:t>REST = </a:t>
+            </a:r>
+            <a:r>
               <a:rPr lang="de-DE" dirty="0" err="1" smtClean="0"/>
-              <a:t>Trello</a:t>
-            </a:r>
-            <a:r>
-              <a:rPr lang="de-DE" dirty="0" smtClean="0"/>
-              <a:t> haben wir verwendet um…</a:t>
+              <a:t>Representational</a:t>
+            </a:r>
+            <a:r>
+              <a:rPr lang="de-DE" baseline="0" dirty="0" smtClean="0"/>
+              <a:t> State Transfer (Programmierparadigma)</a:t>
             </a:r>
             <a:endParaRPr lang="de-DE" dirty="0"/>
           </a:p>
@@ -4872,7 +4997,7 @@
           <a:p>
             <a:fld id="{14BEC569-9E05-4323-A98C-4047FABAF080}" type="slidenum">
               <a:rPr lang="de-DE" smtClean="0"/>
-              <a:t>4</a:t>
+              <a:t>3</a:t>
             </a:fld>
             <a:endParaRPr lang="de-DE"/>
           </a:p>
@@ -4881,7 +5006,7 @@
     </p:spTree>
     <p:extLst>
       <p:ext uri="{BB962C8B-B14F-4D97-AF65-F5344CB8AC3E}">
-        <p14:creationId xmlns:p14="http://schemas.microsoft.com/office/powerpoint/2010/main" val="2237453342"/>
+        <p14:creationId xmlns:p14="http://schemas.microsoft.com/office/powerpoint/2010/main" val="3609227674"/>
       </p:ext>
     </p:extLst>
   </p:cSld>
@@ -4937,60 +5062,37 @@
           <a:p>
             <a:r>
               <a:rPr lang="de-DE" dirty="0" err="1" smtClean="0"/>
+              <a:t>Trello</a:t>
+            </a:r>
+            <a:r>
+              <a:rPr lang="de-DE" dirty="0" smtClean="0"/>
+              <a:t> haben wir verwendet um</a:t>
+            </a:r>
+            <a:r>
+              <a:rPr lang="de-DE" dirty="0" smtClean="0"/>
+              <a:t>…</a:t>
+            </a:r>
+          </a:p>
+          <a:p>
+            <a:endParaRPr lang="de-DE" dirty="0" smtClean="0"/>
+          </a:p>
+          <a:p>
+            <a:r>
+              <a:rPr lang="de-DE" dirty="0" smtClean="0"/>
+              <a:t>Einer hat </a:t>
+            </a:r>
+            <a:r>
+              <a:rPr lang="de-DE" dirty="0" err="1" smtClean="0"/>
               <a:t>Mockups</a:t>
             </a:r>
             <a:r>
               <a:rPr lang="de-DE" dirty="0" smtClean="0"/>
-              <a:t> mit Proto.io erstellt</a:t>
-            </a:r>
-          </a:p>
-          <a:p>
-            <a:endParaRPr lang="de-DE" dirty="0" smtClean="0"/>
-          </a:p>
-          <a:p>
-            <a:r>
-              <a:rPr lang="de-DE" dirty="0" smtClean="0"/>
-              <a:t>Vorteile: </a:t>
-            </a:r>
-          </a:p>
-          <a:p>
-            <a:pPr marL="171450" indent="-171450">
-              <a:buFont typeface="Arial" panose="020B0604020202020204" pitchFamily="34" charset="0"/>
-              <a:buChar char="•"/>
-            </a:pPr>
-            <a:r>
-              <a:rPr lang="de-DE" dirty="0" err="1" smtClean="0"/>
-              <a:t>Mockup</a:t>
-            </a:r>
-            <a:r>
-              <a:rPr lang="de-DE" dirty="0" smtClean="0"/>
-              <a:t> im Material-Design</a:t>
-            </a:r>
-          </a:p>
-          <a:p>
-            <a:pPr marL="171450" indent="-171450">
-              <a:buFont typeface="Arial" panose="020B0604020202020204" pitchFamily="34" charset="0"/>
-              <a:buChar char="•"/>
-            </a:pPr>
-            <a:r>
-              <a:rPr lang="de-DE" dirty="0" smtClean="0"/>
-              <a:t>Interaktiv</a:t>
-            </a:r>
-          </a:p>
-          <a:p>
-            <a:pPr marL="171450" indent="-171450">
-              <a:buFont typeface="Arial" panose="020B0604020202020204" pitchFamily="34" charset="0"/>
-              <a:buChar char="•"/>
-            </a:pPr>
-            <a:r>
-              <a:rPr lang="de-DE" dirty="0" smtClean="0"/>
-              <a:t>Schön</a:t>
-            </a:r>
-          </a:p>
-          <a:p>
-            <a:endParaRPr lang="de-DE" dirty="0" smtClean="0"/>
-          </a:p>
-          <a:p>
+              <a:t> gemacht, der nächste die GUI,</a:t>
+            </a:r>
+            <a:r>
+              <a:rPr lang="de-DE" baseline="0" dirty="0" smtClean="0"/>
+              <a:t> …</a:t>
+            </a:r>
             <a:endParaRPr lang="de-DE" dirty="0"/>
           </a:p>
         </p:txBody>
@@ -5012,7 +5114,7 @@
           <a:p>
             <a:fld id="{14BEC569-9E05-4323-A98C-4047FABAF080}" type="slidenum">
               <a:rPr lang="de-DE" smtClean="0"/>
-              <a:t>5</a:t>
+              <a:t>4</a:t>
             </a:fld>
             <a:endParaRPr lang="de-DE"/>
           </a:p>
@@ -5021,7 +5123,7 @@
     </p:spTree>
     <p:extLst>
       <p:ext uri="{BB962C8B-B14F-4D97-AF65-F5344CB8AC3E}">
-        <p14:creationId xmlns:p14="http://schemas.microsoft.com/office/powerpoint/2010/main" val="1761719000"/>
+        <p14:creationId xmlns:p14="http://schemas.microsoft.com/office/powerpoint/2010/main" val="2237453342"/>
       </p:ext>
     </p:extLst>
   </p:cSld>
@@ -5076,9 +5178,59 @@
           <a:lstStyle/>
           <a:p>
             <a:r>
+              <a:rPr lang="de-DE" dirty="0" err="1" smtClean="0"/>
+              <a:t>Mockups</a:t>
+            </a:r>
+            <a:r>
               <a:rPr lang="de-DE" dirty="0" smtClean="0"/>
-              <a:t>Hier sieht man Interaktivität</a:t>
-            </a:r>
+              <a:t> mit Proto.io erstellt</a:t>
+            </a:r>
+          </a:p>
+          <a:p>
+            <a:endParaRPr lang="de-DE" dirty="0" smtClean="0"/>
+          </a:p>
+          <a:p>
+            <a:r>
+              <a:rPr lang="de-DE" dirty="0" smtClean="0"/>
+              <a:t>Vorteile: </a:t>
+            </a:r>
+          </a:p>
+          <a:p>
+            <a:pPr marL="171450" indent="-171450">
+              <a:buFont typeface="Arial" panose="020B0604020202020204" pitchFamily="34" charset="0"/>
+              <a:buChar char="•"/>
+            </a:pPr>
+            <a:r>
+              <a:rPr lang="de-DE" dirty="0" err="1" smtClean="0"/>
+              <a:t>Mockup</a:t>
+            </a:r>
+            <a:r>
+              <a:rPr lang="de-DE" dirty="0" smtClean="0"/>
+              <a:t> im Material-Design</a:t>
+            </a:r>
+          </a:p>
+          <a:p>
+            <a:pPr marL="171450" indent="-171450">
+              <a:buFont typeface="Arial" panose="020B0604020202020204" pitchFamily="34" charset="0"/>
+              <a:buChar char="•"/>
+            </a:pPr>
+            <a:r>
+              <a:rPr lang="de-DE" dirty="0" smtClean="0"/>
+              <a:t>Interaktiv</a:t>
+            </a:r>
+          </a:p>
+          <a:p>
+            <a:pPr marL="171450" indent="-171450">
+              <a:buFont typeface="Arial" panose="020B0604020202020204" pitchFamily="34" charset="0"/>
+              <a:buChar char="•"/>
+            </a:pPr>
+            <a:r>
+              <a:rPr lang="de-DE" dirty="0" smtClean="0"/>
+              <a:t>Schön</a:t>
+            </a:r>
+          </a:p>
+          <a:p>
+            <a:endParaRPr lang="de-DE" dirty="0" smtClean="0"/>
           </a:p>
           <a:p>
             <a:endParaRPr lang="de-DE" dirty="0"/>
@@ -5102,7 +5254,7 @@
           <a:p>
             <a:fld id="{14BEC569-9E05-4323-A98C-4047FABAF080}" type="slidenum">
               <a:rPr lang="de-DE" smtClean="0"/>
-              <a:t>6</a:t>
+              <a:t>5</a:t>
             </a:fld>
             <a:endParaRPr lang="de-DE"/>
           </a:p>
@@ -5111,7 +5263,7 @@
     </p:spTree>
     <p:extLst>
       <p:ext uri="{BB962C8B-B14F-4D97-AF65-F5344CB8AC3E}">
-        <p14:creationId xmlns:p14="http://schemas.microsoft.com/office/powerpoint/2010/main" val="3495113416"/>
+        <p14:creationId xmlns:p14="http://schemas.microsoft.com/office/powerpoint/2010/main" val="1761719000"/>
       </p:ext>
     </p:extLst>
   </p:cSld>
@@ -5167,77 +5319,7 @@
           <a:p>
             <a:r>
               <a:rPr lang="de-DE" dirty="0" smtClean="0"/>
-              <a:t>3 </a:t>
-            </a:r>
-            <a:r>
-              <a:rPr lang="de-DE" dirty="0" err="1" smtClean="0"/>
-              <a:t>collections</a:t>
-            </a:r>
-            <a:endParaRPr lang="de-DE" dirty="0" smtClean="0"/>
-          </a:p>
-          <a:p>
-            <a:r>
-              <a:rPr lang="de-DE" dirty="0" smtClean="0"/>
-              <a:t>User</a:t>
-            </a:r>
-            <a:r>
-              <a:rPr lang="de-DE" baseline="0" dirty="0" smtClean="0"/>
-              <a:t> -&gt; </a:t>
-            </a:r>
-            <a:r>
-              <a:rPr lang="de-DE" baseline="0" dirty="0" err="1" smtClean="0"/>
-              <a:t>notes.user</a:t>
-            </a:r>
-            <a:endParaRPr lang="de-DE" dirty="0" smtClean="0"/>
-          </a:p>
-          <a:p>
-            <a:endParaRPr lang="de-DE" dirty="0" smtClean="0"/>
-          </a:p>
-          <a:p>
-            <a:r>
-              <a:rPr lang="de-DE" dirty="0" smtClean="0"/>
-              <a:t>_</a:t>
-            </a:r>
-            <a:r>
-              <a:rPr lang="de-DE" dirty="0" err="1" smtClean="0"/>
-              <a:t>id</a:t>
-            </a:r>
-            <a:r>
-              <a:rPr lang="de-DE" baseline="0" dirty="0" smtClean="0"/>
-              <a:t> = </a:t>
-            </a:r>
-            <a:r>
-              <a:rPr lang="de-DE" baseline="0" dirty="0" err="1" smtClean="0"/>
-              <a:t>unique</a:t>
-            </a:r>
-            <a:endParaRPr lang="de-DE" baseline="0" dirty="0" smtClean="0"/>
-          </a:p>
-          <a:p>
-            <a:r>
-              <a:rPr lang="de-DE" baseline="0" dirty="0" err="1" smtClean="0"/>
-              <a:t>User.email</a:t>
-            </a:r>
-            <a:r>
-              <a:rPr lang="de-DE" baseline="0" dirty="0" smtClean="0"/>
-              <a:t> = </a:t>
-            </a:r>
-            <a:r>
-              <a:rPr lang="de-DE" baseline="0" dirty="0" err="1" smtClean="0"/>
-              <a:t>unique</a:t>
-            </a:r>
-            <a:endParaRPr lang="de-DE" baseline="0" dirty="0" smtClean="0"/>
-          </a:p>
-          <a:p>
-            <a:endParaRPr lang="de-DE" baseline="0" dirty="0" smtClean="0"/>
-          </a:p>
-          <a:p>
-            <a:r>
-              <a:rPr lang="de-DE" baseline="0" dirty="0" err="1" smtClean="0"/>
-              <a:t>lastModifiedDate</a:t>
-            </a:r>
-            <a:r>
-              <a:rPr lang="de-DE" baseline="0" dirty="0" smtClean="0"/>
-              <a:t> hat TTL von 24 Stunden</a:t>
+              <a:t>Hier sieht man Interaktivität</a:t>
             </a:r>
           </a:p>
           <a:p>
@@ -5262,7 +5344,7 @@
           <a:p>
             <a:fld id="{14BEC569-9E05-4323-A98C-4047FABAF080}" type="slidenum">
               <a:rPr lang="de-DE" smtClean="0"/>
-              <a:t>7</a:t>
+              <a:t>6</a:t>
             </a:fld>
             <a:endParaRPr lang="de-DE"/>
           </a:p>
@@ -5271,7 +5353,7 @@
     </p:spTree>
     <p:extLst>
       <p:ext uri="{BB962C8B-B14F-4D97-AF65-F5344CB8AC3E}">
-        <p14:creationId xmlns:p14="http://schemas.microsoft.com/office/powerpoint/2010/main" val="3471116280"/>
+        <p14:creationId xmlns:p14="http://schemas.microsoft.com/office/powerpoint/2010/main" val="3495113416"/>
       </p:ext>
     </p:extLst>
   </p:cSld>
@@ -5327,89 +5409,88 @@
           <a:p>
             <a:r>
               <a:rPr lang="de-DE" dirty="0" smtClean="0"/>
-              <a:t>Als </a:t>
+              <a:t>3 </a:t>
             </a:r>
             <a:r>
               <a:rPr lang="de-DE" dirty="0" err="1" smtClean="0"/>
-              <a:t>Technologiestack</a:t>
-            </a:r>
+              <a:t>collections</a:t>
+            </a:r>
+            <a:endParaRPr lang="de-DE" dirty="0" smtClean="0"/>
+          </a:p>
+          <a:p>
             <a:r>
               <a:rPr lang="de-DE" dirty="0" smtClean="0"/>
-              <a:t> verwenden</a:t>
+              <a:t>User</a:t>
             </a:r>
             <a:r>
               <a:rPr lang="de-DE" baseline="0" dirty="0" smtClean="0"/>
-              <a:t> wir den MEAN-Stack</a:t>
+              <a:t> -&gt; </a:t>
+            </a:r>
+            <a:r>
+              <a:rPr lang="de-DE" baseline="0" dirty="0" err="1" smtClean="0"/>
+              <a:t>notes.user</a:t>
+            </a:r>
+            <a:r>
+              <a:rPr lang="de-DE" baseline="0" dirty="0" smtClean="0"/>
+              <a:t> -&gt; Note </a:t>
+            </a:r>
+            <a:r>
+              <a:rPr lang="de-DE" baseline="0" dirty="0" err="1" smtClean="0"/>
+              <a:t>zuordnung</a:t>
             </a:r>
             <a:endParaRPr lang="de-DE" dirty="0" smtClean="0"/>
           </a:p>
           <a:p>
+            <a:endParaRPr lang="de-DE" dirty="0" smtClean="0"/>
+          </a:p>
+          <a:p>
             <a:r>
               <a:rPr lang="de-DE" dirty="0" smtClean="0"/>
-              <a:t>Steht für</a:t>
+              <a:t>_</a:t>
+            </a:r>
+            <a:r>
+              <a:rPr lang="de-DE" dirty="0" err="1" smtClean="0"/>
+              <a:t>id</a:t>
             </a:r>
             <a:r>
               <a:rPr lang="de-DE" baseline="0" dirty="0" smtClean="0"/>
-              <a:t>:</a:t>
-            </a:r>
-            <a:endParaRPr lang="de-DE" dirty="0" smtClean="0"/>
-          </a:p>
-          <a:p>
-            <a:r>
-              <a:rPr lang="de-DE" dirty="0" err="1" smtClean="0"/>
-              <a:t>MongoDB</a:t>
-            </a:r>
-            <a:r>
-              <a:rPr lang="de-DE" dirty="0" smtClean="0"/>
-              <a:t> - </a:t>
-            </a:r>
-            <a:r>
-              <a:rPr lang="de-DE" dirty="0" err="1" smtClean="0"/>
-              <a:t>Persistenzschicht</a:t>
-            </a:r>
-            <a:endParaRPr lang="de-DE" dirty="0" smtClean="0"/>
-          </a:p>
-          <a:p>
-            <a:r>
-              <a:rPr lang="de-DE" dirty="0" err="1" smtClean="0"/>
-              <a:t>ExpressJs</a:t>
-            </a:r>
-            <a:r>
-              <a:rPr lang="de-DE" dirty="0" smtClean="0"/>
-              <a:t> </a:t>
+              <a:t> = </a:t>
+            </a:r>
+            <a:r>
+              <a:rPr lang="de-DE" baseline="0" dirty="0" err="1" smtClean="0"/>
+              <a:t>unique</a:t>
+            </a:r>
+            <a:endParaRPr lang="de-DE" baseline="0" dirty="0" smtClean="0"/>
+          </a:p>
+          <a:p>
+            <a:r>
+              <a:rPr lang="de-DE" baseline="0" dirty="0" err="1" smtClean="0"/>
+              <a:t>User.email</a:t>
             </a:r>
             <a:r>
               <a:rPr lang="de-DE" baseline="0" dirty="0" smtClean="0"/>
-              <a:t>- Server Framework</a:t>
-            </a:r>
-          </a:p>
-          <a:p>
+              <a:t> = </a:t>
+            </a:r>
             <a:r>
               <a:rPr lang="de-DE" baseline="0" dirty="0" err="1" smtClean="0"/>
-              <a:t>AngularJs</a:t>
+              <a:t>unique</a:t>
+            </a:r>
+            <a:endParaRPr lang="de-DE" baseline="0" dirty="0" smtClean="0"/>
+          </a:p>
+          <a:p>
+            <a:endParaRPr lang="de-DE" baseline="0" dirty="0" smtClean="0"/>
+          </a:p>
+          <a:p>
+            <a:r>
+              <a:rPr lang="de-DE" baseline="0" dirty="0" err="1" smtClean="0"/>
+              <a:t>lastModifiedDate</a:t>
             </a:r>
             <a:r>
               <a:rPr lang="de-DE" baseline="0" dirty="0" smtClean="0"/>
-              <a:t> - Client Framework</a:t>
-            </a:r>
-          </a:p>
-          <a:p>
-            <a:r>
-              <a:rPr lang="de-DE" baseline="0" dirty="0" err="1" smtClean="0"/>
-              <a:t>NodeJs</a:t>
-            </a:r>
-            <a:r>
-              <a:rPr lang="de-DE" baseline="0" dirty="0" smtClean="0"/>
-              <a:t> – Server </a:t>
-            </a:r>
-            <a:r>
-              <a:rPr lang="de-DE" baseline="0" dirty="0" err="1" smtClean="0"/>
-              <a:t>Runtime</a:t>
-            </a:r>
-            <a:r>
-              <a:rPr lang="de-DE" baseline="0" dirty="0" smtClean="0"/>
-              <a:t> = Laufzeitumgebung</a:t>
-            </a:r>
+              <a:t> hat TTL von 24 Stunden</a:t>
+            </a:r>
+          </a:p>
+          <a:p>
             <a:endParaRPr lang="de-DE" dirty="0"/>
           </a:p>
         </p:txBody>
@@ -5431,7 +5512,7 @@
           <a:p>
             <a:fld id="{14BEC569-9E05-4323-A98C-4047FABAF080}" type="slidenum">
               <a:rPr lang="de-DE" smtClean="0"/>
-              <a:t>8</a:t>
+              <a:t>7</a:t>
             </a:fld>
             <a:endParaRPr lang="de-DE"/>
           </a:p>
@@ -5440,7 +5521,7 @@
     </p:spTree>
     <p:extLst>
       <p:ext uri="{BB962C8B-B14F-4D97-AF65-F5344CB8AC3E}">
-        <p14:creationId xmlns:p14="http://schemas.microsoft.com/office/powerpoint/2010/main" val="4019237998"/>
+        <p14:creationId xmlns:p14="http://schemas.microsoft.com/office/powerpoint/2010/main" val="3471116280"/>
       </p:ext>
     </p:extLst>
   </p:cSld>
@@ -5494,111 +5575,90 @@
           <a:bodyPr/>
           <a:lstStyle/>
           <a:p>
-            <a:pPr marL="228600" indent="-228600">
-              <a:buAutoNum type="arabicPeriod"/>
-            </a:pPr>
             <a:r>
               <a:rPr lang="de-DE" dirty="0" smtClean="0"/>
-              <a:t>Der Benutzer macht eine</a:t>
+              <a:t>Als </a:t>
+            </a:r>
+            <a:r>
+              <a:rPr lang="de-DE" dirty="0" err="1" smtClean="0"/>
+              <a:t>Technologiestack</a:t>
+            </a:r>
+            <a:r>
+              <a:rPr lang="de-DE" dirty="0" smtClean="0"/>
+              <a:t> verwenden</a:t>
             </a:r>
             <a:r>
               <a:rPr lang="de-DE" baseline="0" dirty="0" smtClean="0"/>
-              <a:t> Eingabe</a:t>
-            </a:r>
-          </a:p>
-          <a:p>
-            <a:pPr marL="228600" indent="-228600">
-              <a:buAutoNum type="arabicPeriod"/>
-            </a:pPr>
+              <a:t> wir den MEAN-Stack</a:t>
+            </a:r>
+            <a:endParaRPr lang="de-DE" dirty="0" smtClean="0"/>
+          </a:p>
+          <a:p>
+            <a:r>
+              <a:rPr lang="de-DE" dirty="0" smtClean="0"/>
+              <a:t>Steht für</a:t>
+            </a:r>
             <a:r>
               <a:rPr lang="de-DE" baseline="0" dirty="0" smtClean="0"/>
-              <a:t>Angular erstellt die Anfrage für den Server</a:t>
-            </a:r>
-          </a:p>
-          <a:p>
-            <a:pPr marL="228600" indent="-228600">
-              <a:buAutoNum type="arabicPeriod"/>
-            </a:pPr>
+              <a:t>:</a:t>
+            </a:r>
+            <a:endParaRPr lang="de-DE" dirty="0" smtClean="0"/>
+          </a:p>
+          <a:p>
+            <a:r>
+              <a:rPr lang="de-DE" dirty="0" err="1" smtClean="0"/>
+              <a:t>MongoDB</a:t>
+            </a:r>
+            <a:r>
+              <a:rPr lang="de-DE" dirty="0" smtClean="0"/>
+              <a:t> - </a:t>
+            </a:r>
+            <a:r>
+              <a:rPr lang="de-DE" dirty="0" err="1" smtClean="0"/>
+              <a:t>Persistenzschicht</a:t>
+            </a:r>
+            <a:endParaRPr lang="de-DE" dirty="0" smtClean="0"/>
+          </a:p>
+          <a:p>
+            <a:r>
+              <a:rPr lang="de-DE" dirty="0" err="1" smtClean="0"/>
+              <a:t>ExpressJs</a:t>
+            </a:r>
+            <a:r>
+              <a:rPr lang="de-DE" dirty="0" smtClean="0"/>
+              <a:t> </a:t>
+            </a:r>
             <a:r>
               <a:rPr lang="de-DE" baseline="0" dirty="0" smtClean="0"/>
-              <a:t>Der </a:t>
-            </a:r>
+              <a:t>- Server Framework</a:t>
+            </a:r>
+          </a:p>
+          <a:p>
             <a:r>
               <a:rPr lang="de-DE" baseline="0" dirty="0" err="1" smtClean="0"/>
-              <a:t>Node</a:t>
+              <a:t>AngularJs</a:t>
             </a:r>
             <a:r>
               <a:rPr lang="de-DE" baseline="0" dirty="0" smtClean="0"/>
-              <a:t> Server verarbeitet die Anfrage</a:t>
-            </a:r>
-          </a:p>
-          <a:p>
-            <a:pPr marL="228600" indent="-228600">
-              <a:buAutoNum type="arabicPeriod"/>
-            </a:pPr>
+              <a:t> - Client Framework</a:t>
+            </a:r>
+          </a:p>
+          <a:p>
+            <a:r>
+              <a:rPr lang="de-DE" baseline="0" dirty="0" err="1" smtClean="0"/>
+              <a:t>NodeJs</a:t>
+            </a:r>
             <a:r>
               <a:rPr lang="de-DE" baseline="0" dirty="0" smtClean="0"/>
-              <a:t>Das Server Framework Express stellt die Anfrage</a:t>
-            </a:r>
-          </a:p>
-          <a:p>
-            <a:pPr marL="228600" indent="-228600">
-              <a:buAutoNum type="arabicPeriod"/>
-            </a:pPr>
+              <a:t> – Server </a:t>
+            </a:r>
+            <a:r>
+              <a:rPr lang="de-DE" baseline="0" dirty="0" err="1" smtClean="0"/>
+              <a:t>Runtime</a:t>
+            </a:r>
             <a:r>
               <a:rPr lang="de-DE" baseline="0" dirty="0" smtClean="0"/>
-              <a:t>Die </a:t>
-            </a:r>
-            <a:r>
-              <a:rPr lang="de-DE" baseline="0" dirty="0" err="1" smtClean="0"/>
-              <a:t>Persistenzschicht</a:t>
-            </a:r>
-            <a:r>
-              <a:rPr lang="de-DE" baseline="0" dirty="0" smtClean="0"/>
-              <a:t> stellt die Daten zur Verfügung</a:t>
-            </a:r>
-          </a:p>
-          <a:p>
-            <a:pPr marL="228600" indent="-228600">
-              <a:buAutoNum type="arabicPeriod"/>
-            </a:pPr>
-            <a:r>
-              <a:rPr lang="de-DE" baseline="0" dirty="0" smtClean="0"/>
-              <a:t>Die Daten werde von Express an den </a:t>
-            </a:r>
-            <a:r>
-              <a:rPr lang="de-DE" baseline="0" dirty="0" err="1" smtClean="0"/>
-              <a:t>Node</a:t>
-            </a:r>
-            <a:r>
-              <a:rPr lang="de-DE" baseline="0" dirty="0" smtClean="0"/>
-              <a:t> Server gesendet</a:t>
-            </a:r>
-          </a:p>
-          <a:p>
-            <a:pPr marL="228600" indent="-228600">
-              <a:buAutoNum type="arabicPeriod"/>
-            </a:pPr>
-            <a:r>
-              <a:rPr lang="de-DE" baseline="0" dirty="0" smtClean="0"/>
-              <a:t>Der </a:t>
-            </a:r>
-            <a:r>
-              <a:rPr lang="de-DE" baseline="0" dirty="0" err="1" smtClean="0"/>
-              <a:t>Node</a:t>
-            </a:r>
-            <a:r>
-              <a:rPr lang="de-DE" baseline="0" dirty="0" smtClean="0"/>
-              <a:t> Server sendet die Daten an das Frontend</a:t>
-            </a:r>
-          </a:p>
-          <a:p>
-            <a:pPr marL="228600" indent="-228600">
-              <a:buAutoNum type="arabicPeriod"/>
-            </a:pPr>
-            <a:r>
-              <a:rPr lang="de-DE" baseline="0" dirty="0" smtClean="0"/>
-              <a:t>Das Frontend stellt die Anfrage dar</a:t>
+              <a:t> = Laufzeitumgebung</a:t>
             </a:r>
             <a:endParaRPr lang="de-DE" dirty="0"/>
           </a:p>
@@ -5621,7 +5681,7 @@
           <a:p>
             <a:fld id="{14BEC569-9E05-4323-A98C-4047FABAF080}" type="slidenum">
               <a:rPr lang="de-DE" smtClean="0"/>
-              <a:t>9</a:t>
+              <a:t>8</a:t>
             </a:fld>
             <a:endParaRPr lang="de-DE"/>
           </a:p>
@@ -5630,7 +5690,7 @@
     </p:spTree>
     <p:extLst>
       <p:ext uri="{BB962C8B-B14F-4D97-AF65-F5344CB8AC3E}">
-        <p14:creationId xmlns:p14="http://schemas.microsoft.com/office/powerpoint/2010/main" val="3591883945"/>
+        <p14:creationId xmlns:p14="http://schemas.microsoft.com/office/powerpoint/2010/main" val="4019237998"/>
       </p:ext>
     </p:extLst>
   </p:cSld>
@@ -5684,42 +5744,111 @@
           <a:bodyPr/>
           <a:lstStyle/>
           <a:p>
+            <a:pPr marL="228600" indent="-228600">
+              <a:buAutoNum type="arabicPeriod"/>
+            </a:pPr>
             <a:r>
               <a:rPr lang="de-DE" dirty="0" smtClean="0"/>
-              <a:t>Registrierung -&gt; E-Mail</a:t>
+              <a:t>Der Benutzer macht eine</a:t>
             </a:r>
             <a:r>
               <a:rPr lang="de-DE" baseline="0" dirty="0" smtClean="0"/>
-              <a:t> Service</a:t>
-            </a:r>
-          </a:p>
-          <a:p>
+              <a:t> Eingabe</a:t>
+            </a:r>
+          </a:p>
+          <a:p>
+            <a:pPr marL="228600" indent="-228600">
+              <a:buAutoNum type="arabicPeriod"/>
+            </a:pPr>
             <a:r>
               <a:rPr lang="de-DE" baseline="0" dirty="0" smtClean="0"/>
-              <a:t>Teilen -&gt; Notizen </a:t>
+              <a:t>Angular erstellt die Anfrage für den Server</a:t>
+            </a:r>
+          </a:p>
+          <a:p>
+            <a:pPr marL="228600" indent="-228600">
+              <a:buAutoNum type="arabicPeriod"/>
+            </a:pPr>
+            <a:r>
+              <a:rPr lang="de-DE" baseline="0" dirty="0" smtClean="0"/>
+              <a:t>Der </a:t>
             </a:r>
             <a:r>
               <a:rPr lang="de-DE" baseline="0" dirty="0" err="1" smtClean="0"/>
-              <a:t>sharen</a:t>
-            </a:r>
-            <a:endParaRPr lang="de-DE" baseline="0" dirty="0" smtClean="0"/>
-          </a:p>
-          <a:p>
+              <a:t>Node</a:t>
+            </a:r>
             <a:r>
               <a:rPr lang="de-DE" baseline="0" dirty="0" smtClean="0"/>
-              <a:t>Archivieren -&gt; bisher nur Delete</a:t>
-            </a:r>
-          </a:p>
-          <a:p>
+              <a:t> Server verarbeitet die Anfrage</a:t>
+            </a:r>
+          </a:p>
+          <a:p>
+            <a:pPr marL="228600" indent="-228600">
+              <a:buAutoNum type="arabicPeriod"/>
+            </a:pPr>
             <a:r>
               <a:rPr lang="de-DE" baseline="0" dirty="0" smtClean="0"/>
-              <a:t>Drag &amp; Drop -&gt; bisher nach Erstellungsdatum</a:t>
-            </a:r>
-          </a:p>
-          <a:p>
+              <a:t>Das Server Framework Express stellt die Anfrage</a:t>
+            </a:r>
+          </a:p>
+          <a:p>
+            <a:pPr marL="228600" indent="-228600">
+              <a:buAutoNum type="arabicPeriod"/>
+            </a:pPr>
             <a:r>
               <a:rPr lang="de-DE" baseline="0" dirty="0" smtClean="0"/>
-              <a:t>Modell erweitern -&gt; RTF-Texte, Checkliste, etc…</a:t>
+              <a:t>Die </a:t>
+            </a:r>
+            <a:r>
+              <a:rPr lang="de-DE" baseline="0" dirty="0" err="1" smtClean="0"/>
+              <a:t>Persistenzschicht</a:t>
+            </a:r>
+            <a:r>
+              <a:rPr lang="de-DE" baseline="0" dirty="0" smtClean="0"/>
+              <a:t> stellt die Daten zur Verfügung</a:t>
+            </a:r>
+          </a:p>
+          <a:p>
+            <a:pPr marL="228600" indent="-228600">
+              <a:buAutoNum type="arabicPeriod"/>
+            </a:pPr>
+            <a:r>
+              <a:rPr lang="de-DE" baseline="0" dirty="0" smtClean="0"/>
+              <a:t>Die Daten werde von Express an den </a:t>
+            </a:r>
+            <a:r>
+              <a:rPr lang="de-DE" baseline="0" dirty="0" err="1" smtClean="0"/>
+              <a:t>Node</a:t>
+            </a:r>
+            <a:r>
+              <a:rPr lang="de-DE" baseline="0" dirty="0" smtClean="0"/>
+              <a:t> Server gesendet</a:t>
+            </a:r>
+          </a:p>
+          <a:p>
+            <a:pPr marL="228600" indent="-228600">
+              <a:buAutoNum type="arabicPeriod"/>
+            </a:pPr>
+            <a:r>
+              <a:rPr lang="de-DE" baseline="0" dirty="0" smtClean="0"/>
+              <a:t>Der </a:t>
+            </a:r>
+            <a:r>
+              <a:rPr lang="de-DE" baseline="0" dirty="0" err="1" smtClean="0"/>
+              <a:t>Node</a:t>
+            </a:r>
+            <a:r>
+              <a:rPr lang="de-DE" baseline="0" dirty="0" smtClean="0"/>
+              <a:t> Server sendet die Daten an das Frontend</a:t>
+            </a:r>
+          </a:p>
+          <a:p>
+            <a:pPr marL="228600" indent="-228600">
+              <a:buAutoNum type="arabicPeriod"/>
+            </a:pPr>
+            <a:r>
+              <a:rPr lang="de-DE" baseline="0" dirty="0" smtClean="0"/>
+              <a:t>Das Frontend stellt die Anfrage dar</a:t>
             </a:r>
             <a:endParaRPr lang="de-DE" dirty="0"/>
           </a:p>
@@ -5742,7 +5871,7 @@
           <a:p>
             <a:fld id="{14BEC569-9E05-4323-A98C-4047FABAF080}" type="slidenum">
               <a:rPr lang="de-DE" smtClean="0"/>
-              <a:t>10</a:t>
+              <a:t>9</a:t>
             </a:fld>
             <a:endParaRPr lang="de-DE"/>
           </a:p>
@@ -5751,7 +5880,7 @@
     </p:spTree>
     <p:extLst>
       <p:ext uri="{BB962C8B-B14F-4D97-AF65-F5344CB8AC3E}">
-        <p14:creationId xmlns:p14="http://schemas.microsoft.com/office/powerpoint/2010/main" val="3168051213"/>
+        <p14:creationId xmlns:p14="http://schemas.microsoft.com/office/powerpoint/2010/main" val="3591883945"/>
       </p:ext>
     </p:extLst>
   </p:cSld>
@@ -6092,7 +6221,7 @@
           <a:p>
             <a:fld id="{03FCE02C-6EC6-4E09-BC2C-9FDED4DE236E}" type="datetimeFigureOut">
               <a:rPr lang="en-US" smtClean="0"/>
-              <a:t>2/10/2016</a:t>
+              <a:t>2/11/2016</a:t>
             </a:fld>
             <a:endParaRPr lang="en-US" dirty="0"/>
           </a:p>
@@ -6417,7 +6546,7 @@
           <a:p>
             <a:fld id="{17205CAA-4E5A-4223-BD55-C5D2841AC9EF}" type="datetimeFigureOut">
               <a:rPr lang="en-US" smtClean="0"/>
-              <a:t>2/10/2016</a:t>
+              <a:t>2/11/2016</a:t>
             </a:fld>
             <a:endParaRPr lang="en-US" dirty="0"/>
           </a:p>
@@ -6667,7 +6796,7 @@
           <a:p>
             <a:fld id="{17205CAA-4E5A-4223-BD55-C5D2841AC9EF}" type="datetimeFigureOut">
               <a:rPr lang="en-US" smtClean="0"/>
-              <a:t>2/10/2016</a:t>
+              <a:t>2/11/2016</a:t>
             </a:fld>
             <a:endParaRPr lang="en-US" dirty="0"/>
           </a:p>
@@ -7008,7 +7137,7 @@
           <a:p>
             <a:fld id="{17205CAA-4E5A-4223-BD55-C5D2841AC9EF}" type="datetimeFigureOut">
               <a:rPr lang="en-US" smtClean="0"/>
-              <a:t>2/10/2016</a:t>
+              <a:t>2/11/2016</a:t>
             </a:fld>
             <a:endParaRPr lang="en-US" dirty="0"/>
           </a:p>
@@ -7357,7 +7486,7 @@
           <a:p>
             <a:fld id="{17205CAA-4E5A-4223-BD55-C5D2841AC9EF}" type="datetimeFigureOut">
               <a:rPr lang="en-US" smtClean="0"/>
-              <a:t>2/10/2016</a:t>
+              <a:t>2/11/2016</a:t>
             </a:fld>
             <a:endParaRPr lang="en-US" dirty="0"/>
           </a:p>
@@ -7733,7 +7862,7 @@
           <a:p>
             <a:fld id="{17205CAA-4E5A-4223-BD55-C5D2841AC9EF}" type="datetimeFigureOut">
               <a:rPr lang="en-US" smtClean="0"/>
-              <a:t>2/10/2016</a:t>
+              <a:t>2/11/2016</a:t>
             </a:fld>
             <a:endParaRPr lang="en-US" dirty="0"/>
           </a:p>
@@ -8205,7 +8334,7 @@
           <a:p>
             <a:fld id="{17205CAA-4E5A-4223-BD55-C5D2841AC9EF}" type="datetimeFigureOut">
               <a:rPr lang="en-US" smtClean="0"/>
-              <a:t>2/10/2016</a:t>
+              <a:t>2/11/2016</a:t>
             </a:fld>
             <a:endParaRPr lang="en-US" dirty="0"/>
           </a:p>
@@ -8413,7 +8542,7 @@
             <a:fld id="{FB075A7A-4A9A-410F-B848-AB998ACC9419}" type="datetimeFigureOut">
               <a:rPr lang="en-US" smtClean="0"/>
               <a:pPr/>
-              <a:t>2/10/2016</a:t>
+              <a:t>2/11/2016</a:t>
             </a:fld>
             <a:endParaRPr lang="en-US" dirty="0"/>
           </a:p>
@@ -8626,7 +8755,7 @@
             <a:fld id="{AA5F3E88-2D66-4D17-B0FA-EA13CB20B2FF}" type="datetimeFigureOut">
               <a:rPr lang="en-US" smtClean="0"/>
               <a:pPr/>
-              <a:t>2/10/2016</a:t>
+              <a:t>2/11/2016</a:t>
             </a:fld>
             <a:endParaRPr lang="en-US" dirty="0"/>
           </a:p>
@@ -8860,7 +8989,7 @@
             <a:fld id="{4D8F36E1-9596-4E98-8786-4A17C5D29C65}" type="datetimeFigureOut">
               <a:rPr lang="en-US" smtClean="0"/>
               <a:pPr/>
-              <a:t>2/10/2016</a:t>
+              <a:t>2/11/2016</a:t>
             </a:fld>
             <a:endParaRPr lang="en-US" dirty="0"/>
           </a:p>
@@ -9109,7 +9238,7 @@
           <a:p>
             <a:fld id="{EE4D1A55-63BC-4BA2-9538-7DDEADA10621}" type="datetimeFigureOut">
               <a:rPr lang="en-US" smtClean="0"/>
-              <a:t>2/10/2016</a:t>
+              <a:t>2/11/2016</a:t>
             </a:fld>
             <a:endParaRPr lang="en-US" dirty="0"/>
           </a:p>
@@ -9378,7 +9507,7 @@
             <a:fld id="{66D01ABB-8821-4BF5-97A9-E1A66ACAEAA9}" type="datetimeFigureOut">
               <a:rPr lang="en-US" smtClean="0"/>
               <a:pPr/>
-              <a:t>2/10/2016</a:t>
+              <a:t>2/11/2016</a:t>
             </a:fld>
             <a:endParaRPr lang="en-US" dirty="0"/>
           </a:p>
@@ -9793,7 +9922,7 @@
             <a:fld id="{20C37B1C-D4A1-4A4F-A470-80868146AFC5}" type="datetimeFigureOut">
               <a:rPr lang="en-US" smtClean="0"/>
               <a:pPr/>
-              <a:t>2/10/2016</a:t>
+              <a:t>2/11/2016</a:t>
             </a:fld>
             <a:endParaRPr lang="en-US" dirty="0"/>
           </a:p>
@@ -9944,7 +10073,7 @@
             <a:fld id="{6D31D1B9-F39E-471E-80A9-595CAA5664AD}" type="datetimeFigureOut">
               <a:rPr lang="en-US" smtClean="0"/>
               <a:pPr/>
-              <a:t>2/10/2016</a:t>
+              <a:t>2/11/2016</a:t>
             </a:fld>
             <a:endParaRPr lang="en-US" dirty="0"/>
           </a:p>
@@ -10072,7 +10201,7 @@
             <a:fld id="{33FCEABC-E2B9-4606-A74F-CB06AF596887}" type="datetimeFigureOut">
               <a:rPr lang="en-US" smtClean="0"/>
               <a:pPr/>
-              <a:t>2/10/2016</a:t>
+              <a:t>2/11/2016</a:t>
             </a:fld>
             <a:endParaRPr lang="en-US" dirty="0"/>
           </a:p>
@@ -10329,7 +10458,7 @@
             <a:fld id="{FA8850A0-01A3-4F4E-AA52-F716A9BFD4EB}" type="datetimeFigureOut">
               <a:rPr lang="en-US" smtClean="0"/>
               <a:pPr/>
-              <a:t>2/10/2016</a:t>
+              <a:t>2/11/2016</a:t>
             </a:fld>
             <a:endParaRPr lang="en-US" dirty="0"/>
           </a:p>
@@ -10645,7 +10774,7 @@
           <a:p>
             <a:fld id="{E5811CCA-BB49-46C7-A0E2-F42339750F9A}" type="datetimeFigureOut">
               <a:rPr lang="en-US" smtClean="0"/>
-              <a:t>2/10/2016</a:t>
+              <a:t>2/11/2016</a:t>
             </a:fld>
             <a:endParaRPr lang="en-US" dirty="0"/>
           </a:p>
@@ -10997,7 +11126,7 @@
           <a:p>
             <a:fld id="{17205CAA-4E5A-4223-BD55-C5D2841AC9EF}" type="datetimeFigureOut">
               <a:rPr lang="en-US" smtClean="0"/>
-              <a:t>2/10/2016</a:t>
+              <a:t>2/11/2016</a:t>
             </a:fld>
             <a:endParaRPr lang="en-US" dirty="0"/>
           </a:p>

</xml_diff>

<commit_message>
Last Edits in DOC
</commit_message>
<xml_diff>
--- a/doc/Präsentation/MEAN Notes.pptx
+++ b/doc/Präsentation/MEAN Notes.pptx
@@ -1986,8 +1986,8 @@
     <dgm:cxn modelId="{0577D253-1036-47A8-B810-A735390FEBE6}" srcId="{A6B4E31E-BF13-43E9-A8DF-1D0CED72AE2B}" destId="{0A180470-D629-4A2F-A707-AC08E7EE7821}" srcOrd="1" destOrd="0" parTransId="{E8C6D964-0C3D-4EE5-93FE-EB8BA448D4DC}" sibTransId="{AEB55458-9C91-4297-89D4-34C873B7BFA6}"/>
     <dgm:cxn modelId="{D39F9551-7A9C-4BBA-B9B5-58E7BD540672}" srcId="{45D67FC7-9484-4BD2-96D9-5DC0D4DC919F}" destId="{D43A8187-F70D-4382-97AF-2C1BAAAD39F2}" srcOrd="3" destOrd="0" parTransId="{B3AF1AFC-2EFD-470D-8334-5BB3800BEAE5}" sibTransId="{BA38E681-6A32-4A4F-9143-88D4B0706EAC}"/>
     <dgm:cxn modelId="{327244BB-FF70-480C-8140-C95AD341320E}" srcId="{0A180470-D629-4A2F-A707-AC08E7EE7821}" destId="{402C3787-C119-4975-B2C3-FDC33B51A950}" srcOrd="3" destOrd="0" parTransId="{6C90D17A-25EE-471C-B063-6FEBC0DB6C7E}" sibTransId="{8534571D-9358-468F-8107-890062D306FB}"/>
+    <dgm:cxn modelId="{5607A11E-0468-4EA4-B201-3E27E70E1982}" type="presOf" srcId="{C3379581-7EC1-4BC6-8381-BAFCA1887E1F}" destId="{F5E4AB33-7C02-4210-A409-8AD4743E5C7F}" srcOrd="0" destOrd="0" presId="urn:microsoft.com/office/officeart/2005/8/layout/hList1"/>
     <dgm:cxn modelId="{A5B0E6D2-FDF1-4B66-A937-34E78F3A23F4}" srcId="{45D67FC7-9484-4BD2-96D9-5DC0D4DC919F}" destId="{A2BFB9B8-DC9E-4DB2-A6FC-2E8A7188049F}" srcOrd="4" destOrd="0" parTransId="{01F339B7-F73F-4572-AB8B-4F804846FC8A}" sibTransId="{6EE000F8-9836-427C-94FC-658B005FF7FA}"/>
-    <dgm:cxn modelId="{5607A11E-0468-4EA4-B201-3E27E70E1982}" type="presOf" srcId="{C3379581-7EC1-4BC6-8381-BAFCA1887E1F}" destId="{F5E4AB33-7C02-4210-A409-8AD4743E5C7F}" srcOrd="0" destOrd="0" presId="urn:microsoft.com/office/officeart/2005/8/layout/hList1"/>
     <dgm:cxn modelId="{E4929EAA-58F6-4332-AB15-6A9CB3579A7D}" srcId="{B76DA727-A040-4538-8008-3CDD5AF6C4CD}" destId="{74DCB112-97B7-43B7-B971-E99A399335BB}" srcOrd="1" destOrd="0" parTransId="{C132FE06-D957-410B-891C-7E9D715895E2}" sibTransId="{3DB06AFA-5E0D-464A-B73D-EF233128865A}"/>
     <dgm:cxn modelId="{F77FF049-E61B-42EA-8C8E-9F2E95115064}" type="presOf" srcId="{7D1F6B58-A72A-43D8-9441-9AFAF2A7FBC3}" destId="{FFF38D35-7D94-4F39-9648-B2AB98F610BE}" srcOrd="0" destOrd="5" presId="urn:microsoft.com/office/officeart/2005/8/layout/hList1"/>
     <dgm:cxn modelId="{5F309194-1D4F-4428-BD83-CF4A32D3DD0B}" type="presOf" srcId="{45D67FC7-9484-4BD2-96D9-5DC0D4DC919F}" destId="{408356D3-9949-4E29-8747-B7EE15A2C512}" srcOrd="0" destOrd="0" presId="urn:microsoft.com/office/officeart/2005/8/layout/hList1"/>
@@ -2003,8 +2003,8 @@
     <dgm:cxn modelId="{A64AE706-5337-4E33-921C-F3A7DC78317B}" type="presOf" srcId="{4D15D454-5719-43AD-ABCB-88009645E105}" destId="{E2FEDD15-6C55-4357-B7C9-D7888B6098CA}" srcOrd="0" destOrd="4" presId="urn:microsoft.com/office/officeart/2005/8/layout/hList1"/>
     <dgm:cxn modelId="{BF47847D-E076-4325-B057-D7CDBECFFEAC}" type="presOf" srcId="{5AA5FD75-5C90-4429-96FE-EA28159F142D}" destId="{19E0F596-C569-49EE-A858-0212E44E8361}" srcOrd="0" destOrd="0" presId="urn:microsoft.com/office/officeart/2005/8/layout/hList1"/>
     <dgm:cxn modelId="{9F665977-5822-484D-8DE1-963728038FAD}" type="presOf" srcId="{A1DBACA7-05CB-48CB-9B53-54FBCB2A5237}" destId="{E2FEDD15-6C55-4357-B7C9-D7888B6098CA}" srcOrd="0" destOrd="1" presId="urn:microsoft.com/office/officeart/2005/8/layout/hList1"/>
+    <dgm:cxn modelId="{DD694FD2-C66C-4BBD-B4FC-2B82FFE3651A}" type="presOf" srcId="{0A180470-D629-4A2F-A707-AC08E7EE7821}" destId="{CEB00F75-F7C3-4B6C-8DA8-4BE0DDA62DD1}" srcOrd="0" destOrd="0" presId="urn:microsoft.com/office/officeart/2005/8/layout/hList1"/>
     <dgm:cxn modelId="{BA27A05B-FD7F-4922-99CF-4CC7281017F3}" type="presOf" srcId="{1C7766AA-29C1-428A-BEF5-8CE292095754}" destId="{E2FEDD15-6C55-4357-B7C9-D7888B6098CA}" srcOrd="0" destOrd="0" presId="urn:microsoft.com/office/officeart/2005/8/layout/hList1"/>
-    <dgm:cxn modelId="{DD694FD2-C66C-4BBD-B4FC-2B82FFE3651A}" type="presOf" srcId="{0A180470-D629-4A2F-A707-AC08E7EE7821}" destId="{CEB00F75-F7C3-4B6C-8DA8-4BE0DDA62DD1}" srcOrd="0" destOrd="0" presId="urn:microsoft.com/office/officeart/2005/8/layout/hList1"/>
     <dgm:cxn modelId="{24F47EC5-40EB-4A7E-BF36-CF1B2EC345A0}" type="presOf" srcId="{844E8EA2-E497-4CA3-B913-F411BEDF9016}" destId="{FFF38D35-7D94-4F39-9648-B2AB98F610BE}" srcOrd="0" destOrd="7" presId="urn:microsoft.com/office/officeart/2005/8/layout/hList1"/>
     <dgm:cxn modelId="{23F1E98B-ABBC-4F70-A0CB-04E81DF0C8D2}" type="presOf" srcId="{26495795-AD98-421D-933B-5002B29E1146}" destId="{E2FEDD15-6C55-4357-B7C9-D7888B6098CA}" srcOrd="0" destOrd="5" presId="urn:microsoft.com/office/officeart/2005/8/layout/hList1"/>
     <dgm:cxn modelId="{AE71030A-1423-47FE-B3FA-C158896A68C8}" srcId="{5AA5FD75-5C90-4429-96FE-EA28159F142D}" destId="{28DA6E57-6E4A-46E2-8F73-AB7912C84143}" srcOrd="2" destOrd="0" parTransId="{375877AB-1F99-4D60-B5EC-F6E910E9DEAD}" sibTransId="{95EBC766-07AF-44C1-BC8F-52303DEBD8A7}"/>
@@ -5066,11 +5066,7 @@
             </a:r>
             <a:r>
               <a:rPr lang="de-DE" dirty="0" smtClean="0"/>
-              <a:t> haben wir verwendet um</a:t>
-            </a:r>
-            <a:r>
-              <a:rPr lang="de-DE" dirty="0" smtClean="0"/>
-              <a:t>…</a:t>
+              <a:t> haben wir verwendet um…</a:t>
             </a:r>
           </a:p>
           <a:p>
@@ -11972,10 +11968,143 @@
         </p:nvSpPr>
         <p:spPr/>
         <p:txBody>
-          <a:bodyPr/>
+          <a:bodyPr>
+            <a:normAutofit/>
+          </a:bodyPr>
           <a:lstStyle/>
           <a:p>
-            <a:endParaRPr lang="de-DE"/>
+            <a:pPr marL="0" indent="0">
+              <a:buNone/>
+            </a:pPr>
+            <a:r>
+              <a:rPr lang="de-DE" dirty="0" smtClean="0"/>
+              <a:t>Bildquellen:</a:t>
+            </a:r>
+          </a:p>
+          <a:p>
+            <a:pPr marL="0" indent="0">
+              <a:buNone/>
+            </a:pPr>
+            <a:r>
+              <a:rPr lang="de-DE" dirty="0"/>
+              <a:t>	</a:t>
+            </a:r>
+            <a:r>
+              <a:rPr lang="de-DE" sz="1600" dirty="0" smtClean="0"/>
+              <a:t>Abb. „</a:t>
+            </a:r>
+            <a:r>
+              <a:rPr lang="de-DE" sz="1600" dirty="0" err="1" smtClean="0"/>
+              <a:t>Mr</a:t>
+            </a:r>
+            <a:r>
+              <a:rPr lang="de-DE" sz="1600" dirty="0" smtClean="0"/>
+              <a:t> Burns“:</a:t>
+            </a:r>
+          </a:p>
+          <a:p>
+            <a:pPr marL="457200" lvl="1" indent="0">
+              <a:buNone/>
+            </a:pPr>
+            <a:r>
+              <a:rPr lang="de-DE" sz="1200" dirty="0">
+                <a:hlinkClick r:id="rId2"/>
+              </a:rPr>
+              <a:t>http://</a:t>
+            </a:r>
+            <a:r>
+              <a:rPr lang="de-DE" sz="1200" dirty="0" smtClean="0">
+                <a:hlinkClick r:id="rId2"/>
+              </a:rPr>
+              <a:t>vignette3.wikia.nocookie.net/simpsons/images/6/6a/Mr_Burns_evil.gif/revision/latest/scale-to-width-down/180?cb=20100702150413</a:t>
+            </a:r>
+            <a:endParaRPr lang="de-DE" sz="1200" dirty="0" smtClean="0"/>
+          </a:p>
+          <a:p>
+            <a:pPr marL="0" indent="0">
+              <a:buNone/>
+            </a:pPr>
+            <a:r>
+              <a:rPr lang="de-DE" sz="1200" dirty="0"/>
+              <a:t>	</a:t>
+            </a:r>
+            <a:r>
+              <a:rPr lang="de-DE" sz="1600" dirty="0" smtClean="0"/>
+              <a:t>Abb. auf Folie 8:</a:t>
+            </a:r>
+          </a:p>
+          <a:p>
+            <a:pPr marL="0" indent="0">
+              <a:buNone/>
+            </a:pPr>
+            <a:r>
+              <a:rPr lang="de-DE" sz="1600" dirty="0" smtClean="0"/>
+              <a:t>	</a:t>
+            </a:r>
+            <a:r>
+              <a:rPr lang="de-DE" sz="1600" dirty="0" smtClean="0">
+                <a:hlinkClick r:id="rId3"/>
+              </a:rPr>
+              <a:t>https</a:t>
+            </a:r>
+            <a:r>
+              <a:rPr lang="de-DE" sz="1600" dirty="0">
+                <a:hlinkClick r:id="rId3"/>
+              </a:rPr>
+              <a:t>://</a:t>
+            </a:r>
+            <a:r>
+              <a:rPr lang="de-DE" sz="1600" dirty="0" smtClean="0">
+                <a:hlinkClick r:id="rId3"/>
+              </a:rPr>
+              <a:t>i.ytimg.com/vi/Jh0er2pRcq8/maxresdefault.jpg</a:t>
+            </a:r>
+            <a:endParaRPr lang="de-DE" sz="1600" dirty="0" smtClean="0"/>
+          </a:p>
+          <a:p>
+            <a:pPr marL="0" indent="0">
+              <a:buNone/>
+            </a:pPr>
+            <a:r>
+              <a:rPr lang="de-DE" sz="1600" dirty="0"/>
+              <a:t>	</a:t>
+            </a:r>
+            <a:r>
+              <a:rPr lang="de-DE" sz="1600" dirty="0" smtClean="0"/>
+              <a:t>Abb</a:t>
+            </a:r>
+            <a:r>
+              <a:rPr lang="de-DE" sz="1600" dirty="0" smtClean="0"/>
+              <a:t>. auf Folie 9:</a:t>
+            </a:r>
+          </a:p>
+          <a:p>
+            <a:pPr marL="0" indent="0">
+              <a:buNone/>
+            </a:pPr>
+            <a:r>
+              <a:rPr lang="de-DE" sz="1600" dirty="0"/>
+              <a:t>	</a:t>
+            </a:r>
+            <a:r>
+              <a:rPr lang="de-DE" sz="1600" dirty="0">
+                <a:hlinkClick r:id="rId4"/>
+              </a:rPr>
+              <a:t>http://</a:t>
+            </a:r>
+            <a:r>
+              <a:rPr lang="de-DE" sz="1600" dirty="0" smtClean="0">
+                <a:hlinkClick r:id="rId4"/>
+              </a:rPr>
+              <a:t>advaitsolutions.in/wp-content/uploads/2015/08/meanjs-1024x492.png</a:t>
+            </a:r>
+            <a:endParaRPr lang="de-DE" sz="1600" dirty="0"/>
+          </a:p>
+          <a:p>
+            <a:pPr marL="0" indent="0">
+              <a:buNone/>
+            </a:pPr>
+            <a:endParaRPr lang="de-DE" sz="1600" dirty="0" smtClean="0"/>
           </a:p>
         </p:txBody>
       </p:sp>

</xml_diff>